<commit_message>
Fixed and improved the high-level introduction.
</commit_message>
<xml_diff>
--- a/doc/UGE in a Nutshell.pptx
+++ b/doc/UGE in a Nutshell.pptx
@@ -3813,15 +3813,7 @@
           <a:p>
             <a:r>
               <a:rPr lang="en-US" sz="3600" dirty="0" smtClean="0"/>
-              <a:t>A </a:t>
-            </a:r>
-            <a:r>
-              <a:rPr lang="en-US" sz="3600" dirty="0" smtClean="0"/>
-              <a:t>Concise, Illustrated </a:t>
-            </a:r>
-            <a:r>
-              <a:rPr lang="en-US" sz="3600" dirty="0" smtClean="0"/>
-              <a:t>Guide to</a:t>
+              <a:t>A Concise, Illustrated Guide to</a:t>
             </a:r>
             <a:br>
               <a:rPr lang="en-US" sz="3600" dirty="0" smtClean="0"/>
@@ -3877,13 +3869,8 @@
             </a:r>
             <a:r>
               <a:rPr lang="en-US" dirty="0" smtClean="0"/>
-              <a:t> Garcia (&lt;franco.garcia@dc.ufscar.br</a:t>
-            </a:r>
-            <a:r>
-              <a:rPr lang="en-US" dirty="0" smtClean="0"/>
-              <a:t>&gt;) - Last Update: 04/04/2014</a:t>
-            </a:r>
-            <a:endParaRPr lang="en-US" dirty="0" smtClean="0"/>
+              <a:t> Garcia (&lt;franco.garcia@dc.ufscar.br&gt;) - Last Update: 04/04/2014</a:t>
+            </a:r>
           </a:p>
           <a:p>
             <a:r>
@@ -4146,6 +4133,40 @@
           </a:prstGeom>
         </p:spPr>
       </p:pic>
+      <p:sp>
+        <p:nvSpPr>
+          <p:cNvPr id="8" name="TextBox 7"/>
+          <p:cNvSpPr txBox="1"/>
+          <p:nvPr/>
+        </p:nvSpPr>
+        <p:spPr>
+          <a:xfrm>
+            <a:off x="1308100" y="1574800"/>
+            <a:ext cx="1384300" cy="369332"/>
+          </a:xfrm>
+          <a:prstGeom prst="rect">
+            <a:avLst/>
+          </a:prstGeom>
+          <a:noFill/>
+        </p:spPr>
+        <p:txBody>
+          <a:bodyPr wrap="square" rtlCol="0">
+            <a:spAutoFit/>
+          </a:bodyPr>
+          <a:lstStyle/>
+          <a:p>
+            <a:r>
+              <a:rPr lang="en-US" dirty="0"/>
+              <a:t>Game </a:t>
+            </a:r>
+            <a:r>
+              <a:rPr lang="en-US" dirty="0" smtClean="0"/>
+              <a:t>Logic</a:t>
+            </a:r>
+            <a:endParaRPr lang="en-US" dirty="0"/>
+          </a:p>
+        </p:txBody>
+      </p:sp>
     </p:spTree>
     <p:extLst>
       <p:ext uri="{BB962C8B-B14F-4D97-AF65-F5344CB8AC3E}">
@@ -4676,6 +4697,104 @@
           </a:prstGeom>
         </p:spPr>
       </p:pic>
+      <p:sp>
+        <p:nvSpPr>
+          <p:cNvPr id="8" name="TextBox 7"/>
+          <p:cNvSpPr txBox="1"/>
+          <p:nvPr/>
+        </p:nvSpPr>
+        <p:spPr>
+          <a:xfrm>
+            <a:off x="1308100" y="1574800"/>
+            <a:ext cx="1384300" cy="369332"/>
+          </a:xfrm>
+          <a:prstGeom prst="rect">
+            <a:avLst/>
+          </a:prstGeom>
+          <a:noFill/>
+        </p:spPr>
+        <p:txBody>
+          <a:bodyPr wrap="square" rtlCol="0">
+            <a:spAutoFit/>
+          </a:bodyPr>
+          <a:lstStyle/>
+          <a:p>
+            <a:r>
+              <a:rPr lang="en-US" dirty="0"/>
+              <a:t>Game </a:t>
+            </a:r>
+            <a:r>
+              <a:rPr lang="en-US" dirty="0" smtClean="0"/>
+              <a:t>Logic</a:t>
+            </a:r>
+            <a:endParaRPr lang="en-US" dirty="0"/>
+          </a:p>
+        </p:txBody>
+      </p:sp>
+      <p:sp>
+        <p:nvSpPr>
+          <p:cNvPr id="9" name="TextBox 8"/>
+          <p:cNvSpPr txBox="1"/>
+          <p:nvPr/>
+        </p:nvSpPr>
+        <p:spPr>
+          <a:xfrm>
+            <a:off x="5403850" y="1574800"/>
+            <a:ext cx="1384300" cy="369332"/>
+          </a:xfrm>
+          <a:prstGeom prst="rect">
+            <a:avLst/>
+          </a:prstGeom>
+          <a:noFill/>
+        </p:spPr>
+        <p:txBody>
+          <a:bodyPr wrap="square" rtlCol="0">
+            <a:spAutoFit/>
+          </a:bodyPr>
+          <a:lstStyle/>
+          <a:p>
+            <a:r>
+              <a:rPr lang="en-US" dirty="0"/>
+              <a:t>Game </a:t>
+            </a:r>
+            <a:r>
+              <a:rPr lang="en-US" dirty="0" smtClean="0"/>
+              <a:t>View</a:t>
+            </a:r>
+            <a:endParaRPr lang="en-US" dirty="0"/>
+          </a:p>
+        </p:txBody>
+      </p:sp>
+      <p:sp>
+        <p:nvSpPr>
+          <p:cNvPr id="10" name="TextBox 9"/>
+          <p:cNvSpPr txBox="1"/>
+          <p:nvPr/>
+        </p:nvSpPr>
+        <p:spPr>
+          <a:xfrm>
+            <a:off x="9855200" y="1574800"/>
+            <a:ext cx="1384300" cy="369332"/>
+          </a:xfrm>
+          <a:prstGeom prst="rect">
+            <a:avLst/>
+          </a:prstGeom>
+          <a:noFill/>
+        </p:spPr>
+        <p:txBody>
+          <a:bodyPr wrap="square" rtlCol="0">
+            <a:spAutoFit/>
+          </a:bodyPr>
+          <a:lstStyle/>
+          <a:p>
+            <a:r>
+              <a:rPr lang="en-US" dirty="0" smtClean="0"/>
+              <a:t>User</a:t>
+            </a:r>
+            <a:endParaRPr lang="en-US" dirty="0"/>
+          </a:p>
+        </p:txBody>
+      </p:sp>
     </p:spTree>
     <p:extLst>
       <p:ext uri="{BB962C8B-B14F-4D97-AF65-F5344CB8AC3E}">
@@ -5546,6 +5665,40 @@
           </a:prstGeom>
         </p:spPr>
       </p:pic>
+      <p:sp>
+        <p:nvSpPr>
+          <p:cNvPr id="9" name="TextBox 8"/>
+          <p:cNvSpPr txBox="1"/>
+          <p:nvPr/>
+        </p:nvSpPr>
+        <p:spPr>
+          <a:xfrm>
+            <a:off x="1308100" y="1574800"/>
+            <a:ext cx="1384300" cy="369332"/>
+          </a:xfrm>
+          <a:prstGeom prst="rect">
+            <a:avLst/>
+          </a:prstGeom>
+          <a:noFill/>
+        </p:spPr>
+        <p:txBody>
+          <a:bodyPr wrap="square" rtlCol="0">
+            <a:spAutoFit/>
+          </a:bodyPr>
+          <a:lstStyle/>
+          <a:p>
+            <a:r>
+              <a:rPr lang="en-US" dirty="0"/>
+              <a:t>Game </a:t>
+            </a:r>
+            <a:r>
+              <a:rPr lang="en-US" dirty="0" smtClean="0"/>
+              <a:t>Logic</a:t>
+            </a:r>
+            <a:endParaRPr lang="en-US" dirty="0"/>
+          </a:p>
+        </p:txBody>
+      </p:sp>
     </p:spTree>
     <p:extLst>
       <p:ext uri="{BB962C8B-B14F-4D97-AF65-F5344CB8AC3E}">
@@ -7459,6 +7612,40 @@
           </p:sp>
         </mc:Fallback>
       </mc:AlternateContent>
+      <p:sp>
+        <p:nvSpPr>
+          <p:cNvPr id="13" name="TextBox 12"/>
+          <p:cNvSpPr txBox="1"/>
+          <p:nvPr/>
+        </p:nvSpPr>
+        <p:spPr>
+          <a:xfrm>
+            <a:off x="1308100" y="1574800"/>
+            <a:ext cx="1384300" cy="369332"/>
+          </a:xfrm>
+          <a:prstGeom prst="rect">
+            <a:avLst/>
+          </a:prstGeom>
+          <a:noFill/>
+        </p:spPr>
+        <p:txBody>
+          <a:bodyPr wrap="square" rtlCol="0">
+            <a:spAutoFit/>
+          </a:bodyPr>
+          <a:lstStyle/>
+          <a:p>
+            <a:r>
+              <a:rPr lang="en-US" dirty="0"/>
+              <a:t>Game </a:t>
+            </a:r>
+            <a:r>
+              <a:rPr lang="en-US" dirty="0" smtClean="0"/>
+              <a:t>Logic</a:t>
+            </a:r>
+            <a:endParaRPr lang="en-US" dirty="0"/>
+          </a:p>
+        </p:txBody>
+      </p:sp>
     </p:spTree>
     <p:extLst>
       <p:ext uri="{BB962C8B-B14F-4D97-AF65-F5344CB8AC3E}">
@@ -7766,22 +7953,13 @@
             </a:r>
             <a:r>
               <a:rPr lang="en-US" sz="3600" dirty="0" smtClean="0"/>
-              <a:t> is game engine aimed to help prototyping (simple) Universally-Accessible Games (UA-Games</a:t>
-            </a:r>
+              <a:t> is game engine aimed to help prototyping (simple) Universally-Accessible Games (UA-Games).</a:t>
+            </a:r>
+          </a:p>
+          <a:p>
             <a:r>
               <a:rPr lang="en-US" sz="3600" dirty="0" smtClean="0"/>
-              <a:t>).</a:t>
-            </a:r>
-            <a:endParaRPr lang="en-US" sz="3600" dirty="0" smtClean="0"/>
-          </a:p>
-          <a:p>
-            <a:r>
-              <a:rPr lang="en-US" sz="3600" dirty="0" smtClean="0"/>
-              <a:t>UA-Games aim to enable users with different interaction (dis)abilities to </a:t>
-            </a:r>
-            <a:r>
-              <a:rPr lang="en-US" sz="3600" dirty="0" smtClean="0"/>
-              <a:t>play*.</a:t>
+              <a:t>UA-Games aim to enable users with different interaction (dis)abilities to play*.</a:t>
             </a:r>
             <a:br>
               <a:rPr lang="en-US" sz="3600" dirty="0" smtClean="0"/>
@@ -8142,15 +8320,7 @@
           <a:p>
             <a:r>
               <a:rPr lang="en-US" dirty="0" smtClean="0"/>
-              <a:t>For instance, last slide added a gravitational acceleration to the game world</a:t>
-            </a:r>
-            <a:r>
-              <a:rPr lang="en-US" dirty="0" smtClean="0"/>
-              <a:t>. With </a:t>
-            </a:r>
-            <a:r>
-              <a:rPr lang="en-US" dirty="0" smtClean="0"/>
-              <a:t>this acceleration, any actors with a </a:t>
+              <a:t>For instance, last slide added a gravitational acceleration to the game world. With this acceleration, any actors with a </a:t>
             </a:r>
             <a:r>
               <a:rPr lang="en-US" dirty="0" err="1" smtClean="0">
@@ -8686,6 +8856,40 @@
           </a:prstGeom>
         </p:spPr>
       </p:pic>
+      <p:sp>
+        <p:nvSpPr>
+          <p:cNvPr id="14" name="TextBox 13"/>
+          <p:cNvSpPr txBox="1"/>
+          <p:nvPr/>
+        </p:nvSpPr>
+        <p:spPr>
+          <a:xfrm>
+            <a:off x="1308100" y="1574800"/>
+            <a:ext cx="1384300" cy="369332"/>
+          </a:xfrm>
+          <a:prstGeom prst="rect">
+            <a:avLst/>
+          </a:prstGeom>
+          <a:noFill/>
+        </p:spPr>
+        <p:txBody>
+          <a:bodyPr wrap="square" rtlCol="0">
+            <a:spAutoFit/>
+          </a:bodyPr>
+          <a:lstStyle/>
+          <a:p>
+            <a:r>
+              <a:rPr lang="en-US" dirty="0"/>
+              <a:t>Game </a:t>
+            </a:r>
+            <a:r>
+              <a:rPr lang="en-US" dirty="0" smtClean="0"/>
+              <a:t>Logic</a:t>
+            </a:r>
+            <a:endParaRPr lang="en-US" dirty="0"/>
+          </a:p>
+        </p:txBody>
+      </p:sp>
     </p:spTree>
     <p:extLst>
       <p:ext uri="{BB962C8B-B14F-4D97-AF65-F5344CB8AC3E}">
@@ -9201,7 +9405,6 @@
               <a:rPr lang="en-US" dirty="0"/>
               <a:t>Relevant Interactions Triggers Events</a:t>
             </a:r>
-            <a:endParaRPr lang="en-US" dirty="0"/>
           </a:p>
         </p:txBody>
       </p:sp>
@@ -9942,6 +10145,40 @@
           </p:sp>
         </mc:Fallback>
       </mc:AlternateContent>
+      <p:sp>
+        <p:nvSpPr>
+          <p:cNvPr id="16" name="TextBox 15"/>
+          <p:cNvSpPr txBox="1"/>
+          <p:nvPr/>
+        </p:nvSpPr>
+        <p:spPr>
+          <a:xfrm>
+            <a:off x="1308100" y="1574800"/>
+            <a:ext cx="1384300" cy="369332"/>
+          </a:xfrm>
+          <a:prstGeom prst="rect">
+            <a:avLst/>
+          </a:prstGeom>
+          <a:noFill/>
+        </p:spPr>
+        <p:txBody>
+          <a:bodyPr wrap="square" rtlCol="0">
+            <a:spAutoFit/>
+          </a:bodyPr>
+          <a:lstStyle/>
+          <a:p>
+            <a:r>
+              <a:rPr lang="en-US" dirty="0"/>
+              <a:t>Game </a:t>
+            </a:r>
+            <a:r>
+              <a:rPr lang="en-US" dirty="0" smtClean="0"/>
+              <a:t>Logic</a:t>
+            </a:r>
+            <a:endParaRPr lang="en-US" dirty="0"/>
+          </a:p>
+        </p:txBody>
+      </p:sp>
     </p:spTree>
     <p:extLst>
       <p:ext uri="{BB962C8B-B14F-4D97-AF65-F5344CB8AC3E}">
@@ -10231,7 +10468,11 @@
             <a:pPr lvl="1"/>
             <a:r>
               <a:rPr lang="en-US" dirty="0" smtClean="0"/>
-              <a:t>AI actors can send game commands;</a:t>
+              <a:t>Artificial Intelligence (AI) </a:t>
+            </a:r>
+            <a:r>
+              <a:rPr lang="en-US" dirty="0" smtClean="0"/>
+              <a:t>actors can send game commands;</a:t>
             </a:r>
           </a:p>
           <a:p>
@@ -11344,6 +11585,40 @@
           </a:prstGeom>
         </p:spPr>
       </p:pic>
+      <p:sp>
+        <p:nvSpPr>
+          <p:cNvPr id="22" name="TextBox 21"/>
+          <p:cNvSpPr txBox="1"/>
+          <p:nvPr/>
+        </p:nvSpPr>
+        <p:spPr>
+          <a:xfrm>
+            <a:off x="1308100" y="1574800"/>
+            <a:ext cx="1384300" cy="369332"/>
+          </a:xfrm>
+          <a:prstGeom prst="rect">
+            <a:avLst/>
+          </a:prstGeom>
+          <a:noFill/>
+        </p:spPr>
+        <p:txBody>
+          <a:bodyPr wrap="square" rtlCol="0">
+            <a:spAutoFit/>
+          </a:bodyPr>
+          <a:lstStyle/>
+          <a:p>
+            <a:r>
+              <a:rPr lang="en-US" dirty="0"/>
+              <a:t>Game </a:t>
+            </a:r>
+            <a:r>
+              <a:rPr lang="en-US" dirty="0" smtClean="0"/>
+              <a:t>Logic</a:t>
+            </a:r>
+            <a:endParaRPr lang="en-US" dirty="0"/>
+          </a:p>
+        </p:txBody>
+      </p:sp>
     </p:spTree>
     <p:extLst>
       <p:ext uri="{BB962C8B-B14F-4D97-AF65-F5344CB8AC3E}">
@@ -12617,6 +12892,74 @@
           </a:prstGeom>
         </p:spPr>
       </p:pic>
+      <p:sp>
+        <p:nvSpPr>
+          <p:cNvPr id="23" name="TextBox 22"/>
+          <p:cNvSpPr txBox="1"/>
+          <p:nvPr/>
+        </p:nvSpPr>
+        <p:spPr>
+          <a:xfrm>
+            <a:off x="1308100" y="1574800"/>
+            <a:ext cx="1384300" cy="369332"/>
+          </a:xfrm>
+          <a:prstGeom prst="rect">
+            <a:avLst/>
+          </a:prstGeom>
+          <a:noFill/>
+        </p:spPr>
+        <p:txBody>
+          <a:bodyPr wrap="square" rtlCol="0">
+            <a:spAutoFit/>
+          </a:bodyPr>
+          <a:lstStyle/>
+          <a:p>
+            <a:r>
+              <a:rPr lang="en-US" dirty="0"/>
+              <a:t>Game </a:t>
+            </a:r>
+            <a:r>
+              <a:rPr lang="en-US" dirty="0" smtClean="0"/>
+              <a:t>Logic</a:t>
+            </a:r>
+            <a:endParaRPr lang="en-US" dirty="0"/>
+          </a:p>
+        </p:txBody>
+      </p:sp>
+      <p:sp>
+        <p:nvSpPr>
+          <p:cNvPr id="24" name="TextBox 23"/>
+          <p:cNvSpPr txBox="1"/>
+          <p:nvPr/>
+        </p:nvSpPr>
+        <p:spPr>
+          <a:xfrm>
+            <a:off x="5403850" y="1574800"/>
+            <a:ext cx="1384300" cy="369332"/>
+          </a:xfrm>
+          <a:prstGeom prst="rect">
+            <a:avLst/>
+          </a:prstGeom>
+          <a:noFill/>
+        </p:spPr>
+        <p:txBody>
+          <a:bodyPr wrap="square" rtlCol="0">
+            <a:spAutoFit/>
+          </a:bodyPr>
+          <a:lstStyle/>
+          <a:p>
+            <a:r>
+              <a:rPr lang="en-US" dirty="0"/>
+              <a:t>Game </a:t>
+            </a:r>
+            <a:r>
+              <a:rPr lang="en-US" dirty="0" smtClean="0"/>
+              <a:t>View</a:t>
+            </a:r>
+            <a:endParaRPr lang="en-US" dirty="0"/>
+          </a:p>
+        </p:txBody>
+      </p:sp>
     </p:spTree>
     <p:extLst>
       <p:ext uri="{BB962C8B-B14F-4D97-AF65-F5344CB8AC3E}">
@@ -12895,7 +13238,6 @@
               <a:rPr lang="en-US" dirty="0" smtClean="0"/>
               <a:t>Simpler games such as Pong, Snake and Space Invaders are much more complex to design and implement when we consider many different interaction abilities.</a:t>
             </a:r>
-            <a:endParaRPr lang="en-US" dirty="0" smtClean="0"/>
           </a:p>
           <a:p>
             <a:r>
@@ -14437,6 +14779,104 @@
           </a:prstGeom>
         </p:spPr>
       </p:pic>
+      <p:sp>
+        <p:nvSpPr>
+          <p:cNvPr id="24" name="TextBox 23"/>
+          <p:cNvSpPr txBox="1"/>
+          <p:nvPr/>
+        </p:nvSpPr>
+        <p:spPr>
+          <a:xfrm>
+            <a:off x="1308100" y="1574800"/>
+            <a:ext cx="1384300" cy="369332"/>
+          </a:xfrm>
+          <a:prstGeom prst="rect">
+            <a:avLst/>
+          </a:prstGeom>
+          <a:noFill/>
+        </p:spPr>
+        <p:txBody>
+          <a:bodyPr wrap="square" rtlCol="0">
+            <a:spAutoFit/>
+          </a:bodyPr>
+          <a:lstStyle/>
+          <a:p>
+            <a:r>
+              <a:rPr lang="en-US" dirty="0"/>
+              <a:t>Game </a:t>
+            </a:r>
+            <a:r>
+              <a:rPr lang="en-US" dirty="0" smtClean="0"/>
+              <a:t>Logic</a:t>
+            </a:r>
+            <a:endParaRPr lang="en-US" dirty="0"/>
+          </a:p>
+        </p:txBody>
+      </p:sp>
+      <p:sp>
+        <p:nvSpPr>
+          <p:cNvPr id="25" name="TextBox 24"/>
+          <p:cNvSpPr txBox="1"/>
+          <p:nvPr/>
+        </p:nvSpPr>
+        <p:spPr>
+          <a:xfrm>
+            <a:off x="5403850" y="1574800"/>
+            <a:ext cx="1384300" cy="369332"/>
+          </a:xfrm>
+          <a:prstGeom prst="rect">
+            <a:avLst/>
+          </a:prstGeom>
+          <a:noFill/>
+        </p:spPr>
+        <p:txBody>
+          <a:bodyPr wrap="square" rtlCol="0">
+            <a:spAutoFit/>
+          </a:bodyPr>
+          <a:lstStyle/>
+          <a:p>
+            <a:r>
+              <a:rPr lang="en-US" dirty="0"/>
+              <a:t>Game </a:t>
+            </a:r>
+            <a:r>
+              <a:rPr lang="en-US" dirty="0" smtClean="0"/>
+              <a:t>View</a:t>
+            </a:r>
+            <a:endParaRPr lang="en-US" dirty="0"/>
+          </a:p>
+        </p:txBody>
+      </p:sp>
+      <p:sp>
+        <p:nvSpPr>
+          <p:cNvPr id="26" name="TextBox 25"/>
+          <p:cNvSpPr txBox="1"/>
+          <p:nvPr/>
+        </p:nvSpPr>
+        <p:spPr>
+          <a:xfrm>
+            <a:off x="9855200" y="1574800"/>
+            <a:ext cx="1384300" cy="369332"/>
+          </a:xfrm>
+          <a:prstGeom prst="rect">
+            <a:avLst/>
+          </a:prstGeom>
+          <a:noFill/>
+        </p:spPr>
+        <p:txBody>
+          <a:bodyPr wrap="square" rtlCol="0">
+            <a:spAutoFit/>
+          </a:bodyPr>
+          <a:lstStyle/>
+          <a:p>
+            <a:r>
+              <a:rPr lang="en-US" dirty="0" smtClean="0"/>
+              <a:t>User</a:t>
+            </a:r>
+            <a:endParaRPr lang="en-US" dirty="0"/>
+          </a:p>
+        </p:txBody>
+      </p:sp>
     </p:spTree>
     <p:extLst>
       <p:ext uri="{BB962C8B-B14F-4D97-AF65-F5344CB8AC3E}">
@@ -15927,6 +16367,104 @@
           </a:prstGeom>
         </p:spPr>
       </p:pic>
+      <p:sp>
+        <p:nvSpPr>
+          <p:cNvPr id="31" name="TextBox 30"/>
+          <p:cNvSpPr txBox="1"/>
+          <p:nvPr/>
+        </p:nvSpPr>
+        <p:spPr>
+          <a:xfrm>
+            <a:off x="1308100" y="1574800"/>
+            <a:ext cx="1384300" cy="369332"/>
+          </a:xfrm>
+          <a:prstGeom prst="rect">
+            <a:avLst/>
+          </a:prstGeom>
+          <a:noFill/>
+        </p:spPr>
+        <p:txBody>
+          <a:bodyPr wrap="square" rtlCol="0">
+            <a:spAutoFit/>
+          </a:bodyPr>
+          <a:lstStyle/>
+          <a:p>
+            <a:r>
+              <a:rPr lang="en-US" dirty="0"/>
+              <a:t>Game </a:t>
+            </a:r>
+            <a:r>
+              <a:rPr lang="en-US" dirty="0" smtClean="0"/>
+              <a:t>Logic</a:t>
+            </a:r>
+            <a:endParaRPr lang="en-US" dirty="0"/>
+          </a:p>
+        </p:txBody>
+      </p:sp>
+      <p:sp>
+        <p:nvSpPr>
+          <p:cNvPr id="32" name="TextBox 31"/>
+          <p:cNvSpPr txBox="1"/>
+          <p:nvPr/>
+        </p:nvSpPr>
+        <p:spPr>
+          <a:xfrm>
+            <a:off x="5403850" y="1574800"/>
+            <a:ext cx="1384300" cy="369332"/>
+          </a:xfrm>
+          <a:prstGeom prst="rect">
+            <a:avLst/>
+          </a:prstGeom>
+          <a:noFill/>
+        </p:spPr>
+        <p:txBody>
+          <a:bodyPr wrap="square" rtlCol="0">
+            <a:spAutoFit/>
+          </a:bodyPr>
+          <a:lstStyle/>
+          <a:p>
+            <a:r>
+              <a:rPr lang="en-US" dirty="0"/>
+              <a:t>Game </a:t>
+            </a:r>
+            <a:r>
+              <a:rPr lang="en-US" dirty="0" smtClean="0"/>
+              <a:t>View</a:t>
+            </a:r>
+            <a:endParaRPr lang="en-US" dirty="0"/>
+          </a:p>
+        </p:txBody>
+      </p:sp>
+      <p:sp>
+        <p:nvSpPr>
+          <p:cNvPr id="33" name="TextBox 32"/>
+          <p:cNvSpPr txBox="1"/>
+          <p:nvPr/>
+        </p:nvSpPr>
+        <p:spPr>
+          <a:xfrm>
+            <a:off x="9855200" y="1574800"/>
+            <a:ext cx="1384300" cy="369332"/>
+          </a:xfrm>
+          <a:prstGeom prst="rect">
+            <a:avLst/>
+          </a:prstGeom>
+          <a:noFill/>
+        </p:spPr>
+        <p:txBody>
+          <a:bodyPr wrap="square" rtlCol="0">
+            <a:spAutoFit/>
+          </a:bodyPr>
+          <a:lstStyle/>
+          <a:p>
+            <a:r>
+              <a:rPr lang="en-US" dirty="0" smtClean="0"/>
+              <a:t>User</a:t>
+            </a:r>
+            <a:endParaRPr lang="en-US" dirty="0"/>
+          </a:p>
+        </p:txBody>
+      </p:sp>
     </p:spTree>
     <p:extLst>
       <p:ext uri="{BB962C8B-B14F-4D97-AF65-F5344CB8AC3E}">
@@ -16239,11 +16777,7 @@
             </a:r>
             <a:r>
               <a:rPr lang="en-US" dirty="0" smtClean="0"/>
-              <a:t>public (for instance, Access Invaders</a:t>
-            </a:r>
-            <a:r>
-              <a:rPr lang="en-US" dirty="0" smtClean="0"/>
-              <a:t>).</a:t>
+              <a:t>public (for instance, Access Invaders).</a:t>
             </a:r>
           </a:p>
           <a:p>
@@ -18068,6 +18602,104 @@
           </a:p>
         </p:txBody>
       </p:sp>
+      <p:sp>
+        <p:nvSpPr>
+          <p:cNvPr id="46" name="TextBox 45"/>
+          <p:cNvSpPr txBox="1"/>
+          <p:nvPr/>
+        </p:nvSpPr>
+        <p:spPr>
+          <a:xfrm>
+            <a:off x="1308100" y="1574800"/>
+            <a:ext cx="1384300" cy="369332"/>
+          </a:xfrm>
+          <a:prstGeom prst="rect">
+            <a:avLst/>
+          </a:prstGeom>
+          <a:noFill/>
+        </p:spPr>
+        <p:txBody>
+          <a:bodyPr wrap="square" rtlCol="0">
+            <a:spAutoFit/>
+          </a:bodyPr>
+          <a:lstStyle/>
+          <a:p>
+            <a:r>
+              <a:rPr lang="en-US" dirty="0"/>
+              <a:t>Game </a:t>
+            </a:r>
+            <a:r>
+              <a:rPr lang="en-US" dirty="0" smtClean="0"/>
+              <a:t>Logic</a:t>
+            </a:r>
+            <a:endParaRPr lang="en-US" dirty="0"/>
+          </a:p>
+        </p:txBody>
+      </p:sp>
+      <p:sp>
+        <p:nvSpPr>
+          <p:cNvPr id="47" name="TextBox 46"/>
+          <p:cNvSpPr txBox="1"/>
+          <p:nvPr/>
+        </p:nvSpPr>
+        <p:spPr>
+          <a:xfrm>
+            <a:off x="5403850" y="1574800"/>
+            <a:ext cx="1384300" cy="369332"/>
+          </a:xfrm>
+          <a:prstGeom prst="rect">
+            <a:avLst/>
+          </a:prstGeom>
+          <a:noFill/>
+        </p:spPr>
+        <p:txBody>
+          <a:bodyPr wrap="square" rtlCol="0">
+            <a:spAutoFit/>
+          </a:bodyPr>
+          <a:lstStyle/>
+          <a:p>
+            <a:r>
+              <a:rPr lang="en-US" dirty="0"/>
+              <a:t>Game </a:t>
+            </a:r>
+            <a:r>
+              <a:rPr lang="en-US" dirty="0" smtClean="0"/>
+              <a:t>View</a:t>
+            </a:r>
+            <a:endParaRPr lang="en-US" dirty="0"/>
+          </a:p>
+        </p:txBody>
+      </p:sp>
+      <p:sp>
+        <p:nvSpPr>
+          <p:cNvPr id="48" name="TextBox 47"/>
+          <p:cNvSpPr txBox="1"/>
+          <p:nvPr/>
+        </p:nvSpPr>
+        <p:spPr>
+          <a:xfrm>
+            <a:off x="9855200" y="1574800"/>
+            <a:ext cx="1384300" cy="369332"/>
+          </a:xfrm>
+          <a:prstGeom prst="rect">
+            <a:avLst/>
+          </a:prstGeom>
+          <a:noFill/>
+        </p:spPr>
+        <p:txBody>
+          <a:bodyPr wrap="square" rtlCol="0">
+            <a:spAutoFit/>
+          </a:bodyPr>
+          <a:lstStyle/>
+          <a:p>
+            <a:r>
+              <a:rPr lang="en-US" dirty="0" smtClean="0"/>
+              <a:t>User</a:t>
+            </a:r>
+            <a:endParaRPr lang="en-US" dirty="0"/>
+          </a:p>
+        </p:txBody>
+      </p:sp>
     </p:spTree>
     <p:extLst>
       <p:ext uri="{BB962C8B-B14F-4D97-AF65-F5344CB8AC3E}">
@@ -18341,36 +18973,11 @@
                 <a:latin typeface="Consolas" panose="020B0609020204030204" pitchFamily="49" charset="0"/>
                 <a:cs typeface="Consolas" panose="020B0609020204030204" pitchFamily="49" charset="0"/>
               </a:rPr>
-              <a:t>D</a:t>
-            </a:r>
-            <a:r>
-              <a:rPr lang="en-US" dirty="0" err="1" smtClean="0">
-                <a:latin typeface="Consolas" panose="020B0609020204030204" pitchFamily="49" charset="0"/>
-                <a:cs typeface="Consolas" panose="020B0609020204030204" pitchFamily="49" charset="0"/>
-              </a:rPr>
-              <a:t>rawable</a:t>
-            </a:r>
-            <a:r>
-              <a:rPr lang="en-US" dirty="0" err="1" smtClean="0">
-                <a:latin typeface="Consolas" panose="020B0609020204030204" pitchFamily="49" charset="0"/>
-                <a:cs typeface="Consolas" panose="020B0609020204030204" pitchFamily="49" charset="0"/>
-              </a:rPr>
-              <a:t>C</a:t>
-            </a:r>
-            <a:r>
-              <a:rPr lang="en-US" dirty="0" err="1" smtClean="0">
-                <a:latin typeface="Consolas" panose="020B0609020204030204" pitchFamily="49" charset="0"/>
-                <a:cs typeface="Consolas" panose="020B0609020204030204" pitchFamily="49" charset="0"/>
-              </a:rPr>
-              <a:t>omponent</a:t>
+              <a:t>DrawableComponent</a:t>
             </a:r>
             <a:r>
               <a:rPr lang="en-US" dirty="0" smtClean="0"/>
-              <a:t> </a:t>
-            </a:r>
-            <a:r>
-              <a:rPr lang="en-US" dirty="0" smtClean="0"/>
-              <a:t>adds visual stimuli, whilst an </a:t>
+              <a:t> adds visual stimuli, whilst an </a:t>
             </a:r>
             <a:r>
               <a:rPr lang="en-US" dirty="0" err="1" smtClean="0">
@@ -18381,11 +18988,7 @@
             </a:r>
             <a:r>
               <a:rPr lang="en-US" dirty="0" smtClean="0"/>
-              <a:t> </a:t>
-            </a:r>
-            <a:r>
-              <a:rPr lang="en-US" dirty="0" smtClean="0"/>
-              <a:t>adds aural stimuli.</a:t>
+              <a:t> adds aural stimuli.</a:t>
             </a:r>
           </a:p>
           <a:p>
@@ -18677,7 +19280,11 @@
             <a:pPr lvl="1"/>
             <a:r>
               <a:rPr lang="en-US" dirty="0" smtClean="0"/>
-              <a:t>AI helpers.</a:t>
+              <a:t>AI controlled </a:t>
+            </a:r>
+            <a:r>
+              <a:rPr lang="en-US" dirty="0" smtClean="0"/>
+              <a:t>helpers.</a:t>
             </a:r>
           </a:p>
           <a:p>
@@ -19013,7 +19620,7 @@
           <a:graphicData uri="http://schemas.openxmlformats.org/presentationml/2006/ole">
             <mc:AlternateContent xmlns:mc="http://schemas.openxmlformats.org/markup-compatibility/2006">
               <mc:Choice xmlns:v="urn:schemas-microsoft-com:vml" Requires="v">
-                <p:oleObj spid="_x0000_s1076" name="Visio" r:id="rId3" imgW="5981700" imgH="2695485" progId="Visio.Drawing.15">
+                <p:oleObj spid="_x0000_s1091" name="Visio" r:id="rId3" imgW="5981700" imgH="2695485" progId="Visio.Drawing.15">
                   <p:embed/>
                 </p:oleObj>
               </mc:Choice>
@@ -19152,7 +19759,7 @@
           <a:graphicData uri="http://schemas.openxmlformats.org/presentationml/2006/ole">
             <mc:AlternateContent xmlns:mc="http://schemas.openxmlformats.org/markup-compatibility/2006">
               <mc:Choice xmlns:v="urn:schemas-microsoft-com:vml" Requires="v">
-                <p:oleObj spid="_x0000_s1077" name="Visio" r:id="rId5" imgW="5943600" imgH="2695485" progId="Visio.Drawing.15">
+                <p:oleObj spid="_x0000_s1092" name="Visio" r:id="rId5" imgW="5943600" imgH="2695485" progId="Visio.Drawing.15">
                   <p:embed/>
                 </p:oleObj>
               </mc:Choice>
@@ -19291,7 +19898,7 @@
           <a:graphicData uri="http://schemas.openxmlformats.org/presentationml/2006/ole">
             <mc:AlternateContent xmlns:mc="http://schemas.openxmlformats.org/markup-compatibility/2006">
               <mc:Choice xmlns:v="urn:schemas-microsoft-com:vml" Requires="v">
-                <p:oleObj spid="_x0000_s1078" name="Visio" r:id="rId7" imgW="5981700" imgH="3591015" progId="Visio.Drawing.15">
+                <p:oleObj spid="_x0000_s1093" name="Visio" r:id="rId7" imgW="5981700" imgH="3591015" progId="Visio.Drawing.15">
                   <p:embed/>
                 </p:oleObj>
               </mc:Choice>
@@ -19596,11 +20203,7 @@
             </a:r>
             <a:r>
               <a:rPr lang="en-US" dirty="0" smtClean="0"/>
-              <a:t> goals </a:t>
-            </a:r>
-            <a:r>
-              <a:rPr lang="en-US" dirty="0" smtClean="0"/>
-              <a:t>are to:</a:t>
+              <a:t> goals are to:</a:t>
             </a:r>
           </a:p>
           <a:p>
@@ -21571,6 +22174,104 @@
           </a:p>
         </p:txBody>
       </p:sp>
+      <p:sp>
+        <p:nvSpPr>
+          <p:cNvPr id="48" name="TextBox 47"/>
+          <p:cNvSpPr txBox="1"/>
+          <p:nvPr/>
+        </p:nvSpPr>
+        <p:spPr>
+          <a:xfrm>
+            <a:off x="1308100" y="1574800"/>
+            <a:ext cx="1384300" cy="369332"/>
+          </a:xfrm>
+          <a:prstGeom prst="rect">
+            <a:avLst/>
+          </a:prstGeom>
+          <a:noFill/>
+        </p:spPr>
+        <p:txBody>
+          <a:bodyPr wrap="square" rtlCol="0">
+            <a:spAutoFit/>
+          </a:bodyPr>
+          <a:lstStyle/>
+          <a:p>
+            <a:r>
+              <a:rPr lang="en-US" dirty="0"/>
+              <a:t>Game </a:t>
+            </a:r>
+            <a:r>
+              <a:rPr lang="en-US" dirty="0" smtClean="0"/>
+              <a:t>Logic</a:t>
+            </a:r>
+            <a:endParaRPr lang="en-US" dirty="0"/>
+          </a:p>
+        </p:txBody>
+      </p:sp>
+      <p:sp>
+        <p:nvSpPr>
+          <p:cNvPr id="49" name="TextBox 48"/>
+          <p:cNvSpPr txBox="1"/>
+          <p:nvPr/>
+        </p:nvSpPr>
+        <p:spPr>
+          <a:xfrm>
+            <a:off x="5403850" y="1574800"/>
+            <a:ext cx="1384300" cy="369332"/>
+          </a:xfrm>
+          <a:prstGeom prst="rect">
+            <a:avLst/>
+          </a:prstGeom>
+          <a:noFill/>
+        </p:spPr>
+        <p:txBody>
+          <a:bodyPr wrap="square" rtlCol="0">
+            <a:spAutoFit/>
+          </a:bodyPr>
+          <a:lstStyle/>
+          <a:p>
+            <a:r>
+              <a:rPr lang="en-US" dirty="0"/>
+              <a:t>Game </a:t>
+            </a:r>
+            <a:r>
+              <a:rPr lang="en-US" dirty="0" smtClean="0"/>
+              <a:t>View</a:t>
+            </a:r>
+            <a:endParaRPr lang="en-US" dirty="0"/>
+          </a:p>
+        </p:txBody>
+      </p:sp>
+      <p:sp>
+        <p:nvSpPr>
+          <p:cNvPr id="50" name="TextBox 49"/>
+          <p:cNvSpPr txBox="1"/>
+          <p:nvPr/>
+        </p:nvSpPr>
+        <p:spPr>
+          <a:xfrm>
+            <a:off x="9855200" y="1574800"/>
+            <a:ext cx="1384300" cy="369332"/>
+          </a:xfrm>
+          <a:prstGeom prst="rect">
+            <a:avLst/>
+          </a:prstGeom>
+          <a:noFill/>
+        </p:spPr>
+        <p:txBody>
+          <a:bodyPr wrap="square" rtlCol="0">
+            <a:spAutoFit/>
+          </a:bodyPr>
+          <a:lstStyle/>
+          <a:p>
+            <a:r>
+              <a:rPr lang="en-US" dirty="0" smtClean="0"/>
+              <a:t>User</a:t>
+            </a:r>
+            <a:endParaRPr lang="en-US" dirty="0"/>
+          </a:p>
+        </p:txBody>
+      </p:sp>
     </p:spTree>
     <p:extLst>
       <p:ext uri="{BB962C8B-B14F-4D97-AF65-F5344CB8AC3E}">
@@ -21819,7 +22520,15 @@
           <a:p>
             <a:r>
               <a:rPr lang="en-US" dirty="0" smtClean="0"/>
-              <a:t>The Game Logic is event-driven. This mean the game implementation has already several existing events what can be handled to provide feedback.</a:t>
+              <a:t>The Game Logic is event-driven. This mean the game implementation has already several existing events </a:t>
+            </a:r>
+            <a:r>
+              <a:rPr lang="en-US" dirty="0" smtClean="0"/>
+              <a:t>that </a:t>
+            </a:r>
+            <a:r>
+              <a:rPr lang="en-US" dirty="0" smtClean="0"/>
+              <a:t>can be handled to provide feedback.</a:t>
             </a:r>
           </a:p>
           <a:p>
@@ -24645,6 +25354,104 @@
           </a:p>
         </p:txBody>
       </p:sp>
+      <p:sp>
+        <p:nvSpPr>
+          <p:cNvPr id="50" name="TextBox 49"/>
+          <p:cNvSpPr txBox="1"/>
+          <p:nvPr/>
+        </p:nvSpPr>
+        <p:spPr>
+          <a:xfrm>
+            <a:off x="1308100" y="1574800"/>
+            <a:ext cx="1384300" cy="369332"/>
+          </a:xfrm>
+          <a:prstGeom prst="rect">
+            <a:avLst/>
+          </a:prstGeom>
+          <a:noFill/>
+        </p:spPr>
+        <p:txBody>
+          <a:bodyPr wrap="square" rtlCol="0">
+            <a:spAutoFit/>
+          </a:bodyPr>
+          <a:lstStyle/>
+          <a:p>
+            <a:r>
+              <a:rPr lang="en-US" dirty="0"/>
+              <a:t>Game </a:t>
+            </a:r>
+            <a:r>
+              <a:rPr lang="en-US" dirty="0" smtClean="0"/>
+              <a:t>Logic</a:t>
+            </a:r>
+            <a:endParaRPr lang="en-US" dirty="0"/>
+          </a:p>
+        </p:txBody>
+      </p:sp>
+      <p:sp>
+        <p:nvSpPr>
+          <p:cNvPr id="51" name="TextBox 50"/>
+          <p:cNvSpPr txBox="1"/>
+          <p:nvPr/>
+        </p:nvSpPr>
+        <p:spPr>
+          <a:xfrm>
+            <a:off x="5403850" y="1574800"/>
+            <a:ext cx="1384300" cy="369332"/>
+          </a:xfrm>
+          <a:prstGeom prst="rect">
+            <a:avLst/>
+          </a:prstGeom>
+          <a:noFill/>
+        </p:spPr>
+        <p:txBody>
+          <a:bodyPr wrap="square" rtlCol="0">
+            <a:spAutoFit/>
+          </a:bodyPr>
+          <a:lstStyle/>
+          <a:p>
+            <a:r>
+              <a:rPr lang="en-US" dirty="0"/>
+              <a:t>Game </a:t>
+            </a:r>
+            <a:r>
+              <a:rPr lang="en-US" dirty="0" smtClean="0"/>
+              <a:t>View</a:t>
+            </a:r>
+            <a:endParaRPr lang="en-US" dirty="0"/>
+          </a:p>
+        </p:txBody>
+      </p:sp>
+      <p:sp>
+        <p:nvSpPr>
+          <p:cNvPr id="52" name="TextBox 51"/>
+          <p:cNvSpPr txBox="1"/>
+          <p:nvPr/>
+        </p:nvSpPr>
+        <p:spPr>
+          <a:xfrm>
+            <a:off x="9855200" y="1574800"/>
+            <a:ext cx="1384300" cy="369332"/>
+          </a:xfrm>
+          <a:prstGeom prst="rect">
+            <a:avLst/>
+          </a:prstGeom>
+          <a:noFill/>
+        </p:spPr>
+        <p:txBody>
+          <a:bodyPr wrap="square" rtlCol="0">
+            <a:spAutoFit/>
+          </a:bodyPr>
+          <a:lstStyle/>
+          <a:p>
+            <a:r>
+              <a:rPr lang="en-US" dirty="0" smtClean="0"/>
+              <a:t>User</a:t>
+            </a:r>
+            <a:endParaRPr lang="en-US" dirty="0"/>
+          </a:p>
+        </p:txBody>
+      </p:sp>
     </p:spTree>
     <p:extLst>
       <p:ext uri="{BB962C8B-B14F-4D97-AF65-F5344CB8AC3E}">
@@ -26909,6 +27716,104 @@
           </a:p>
         </p:txBody>
       </p:sp>
+      <p:sp>
+        <p:nvSpPr>
+          <p:cNvPr id="50" name="TextBox 49"/>
+          <p:cNvSpPr txBox="1"/>
+          <p:nvPr/>
+        </p:nvSpPr>
+        <p:spPr>
+          <a:xfrm>
+            <a:off x="1308100" y="1574800"/>
+            <a:ext cx="1384300" cy="369332"/>
+          </a:xfrm>
+          <a:prstGeom prst="rect">
+            <a:avLst/>
+          </a:prstGeom>
+          <a:noFill/>
+        </p:spPr>
+        <p:txBody>
+          <a:bodyPr wrap="square" rtlCol="0">
+            <a:spAutoFit/>
+          </a:bodyPr>
+          <a:lstStyle/>
+          <a:p>
+            <a:r>
+              <a:rPr lang="en-US" dirty="0"/>
+              <a:t>Game </a:t>
+            </a:r>
+            <a:r>
+              <a:rPr lang="en-US" dirty="0" smtClean="0"/>
+              <a:t>Logic</a:t>
+            </a:r>
+            <a:endParaRPr lang="en-US" dirty="0"/>
+          </a:p>
+        </p:txBody>
+      </p:sp>
+      <p:sp>
+        <p:nvSpPr>
+          <p:cNvPr id="51" name="TextBox 50"/>
+          <p:cNvSpPr txBox="1"/>
+          <p:nvPr/>
+        </p:nvSpPr>
+        <p:spPr>
+          <a:xfrm>
+            <a:off x="5403850" y="1574800"/>
+            <a:ext cx="1384300" cy="369332"/>
+          </a:xfrm>
+          <a:prstGeom prst="rect">
+            <a:avLst/>
+          </a:prstGeom>
+          <a:noFill/>
+        </p:spPr>
+        <p:txBody>
+          <a:bodyPr wrap="square" rtlCol="0">
+            <a:spAutoFit/>
+          </a:bodyPr>
+          <a:lstStyle/>
+          <a:p>
+            <a:r>
+              <a:rPr lang="en-US" dirty="0"/>
+              <a:t>Game </a:t>
+            </a:r>
+            <a:r>
+              <a:rPr lang="en-US" dirty="0" smtClean="0"/>
+              <a:t>View</a:t>
+            </a:r>
+            <a:endParaRPr lang="en-US" dirty="0"/>
+          </a:p>
+        </p:txBody>
+      </p:sp>
+      <p:sp>
+        <p:nvSpPr>
+          <p:cNvPr id="52" name="TextBox 51"/>
+          <p:cNvSpPr txBox="1"/>
+          <p:nvPr/>
+        </p:nvSpPr>
+        <p:spPr>
+          <a:xfrm>
+            <a:off x="9855200" y="1574800"/>
+            <a:ext cx="1384300" cy="369332"/>
+          </a:xfrm>
+          <a:prstGeom prst="rect">
+            <a:avLst/>
+          </a:prstGeom>
+          <a:noFill/>
+        </p:spPr>
+        <p:txBody>
+          <a:bodyPr wrap="square" rtlCol="0">
+            <a:spAutoFit/>
+          </a:bodyPr>
+          <a:lstStyle/>
+          <a:p>
+            <a:r>
+              <a:rPr lang="en-US" dirty="0" smtClean="0"/>
+              <a:t>User</a:t>
+            </a:r>
+            <a:endParaRPr lang="en-US" dirty="0"/>
+          </a:p>
+        </p:txBody>
+      </p:sp>
     </p:spTree>
     <p:extLst>
       <p:ext uri="{BB962C8B-B14F-4D97-AF65-F5344CB8AC3E}">
@@ -27752,7 +28657,9 @@
         </p:nvSpPr>
         <p:spPr/>
         <p:txBody>
-          <a:bodyPr/>
+          <a:bodyPr>
+            <a:normAutofit lnSpcReduction="10000"/>
+          </a:bodyPr>
           <a:lstStyle/>
           <a:p>
             <a:r>
@@ -27769,9 +28676,32 @@
             </a:r>
             <a:r>
               <a:rPr lang="en-US" dirty="0" smtClean="0"/>
-              <a:t>flexibility and adaptability.</a:t>
-            </a:r>
-            <a:endParaRPr lang="en-US" dirty="0"/>
+              <a:t>flexibility and adaptability</a:t>
+            </a:r>
+            <a:r>
+              <a:rPr lang="en-US" dirty="0" smtClean="0"/>
+              <a:t>.</a:t>
+            </a:r>
+          </a:p>
+          <a:p>
+            <a:pPr lvl="1"/>
+            <a:r>
+              <a:rPr lang="en-US" dirty="0" err="1" smtClean="0"/>
+              <a:t>UGE</a:t>
+            </a:r>
+            <a:r>
+              <a:rPr lang="en-US" dirty="0" smtClean="0"/>
+              <a:t> rewrites and extends the very flexible </a:t>
+            </a:r>
+            <a:r>
+              <a:rPr lang="en-US" dirty="0" err="1" smtClean="0"/>
+              <a:t>McShaffy</a:t>
+            </a:r>
+            <a:r>
+              <a:rPr lang="en-US" dirty="0" smtClean="0"/>
+              <a:t> and Graham’s GCC4 engine* to create a coherent engine for run-time tailoring.</a:t>
+            </a:r>
+            <a:endParaRPr lang="en-US" dirty="0" smtClean="0"/>
           </a:p>
           <a:p>
             <a:r>
@@ -27783,7 +28713,11 @@
             <a:pPr lvl="1"/>
             <a:r>
               <a:rPr lang="en-US" dirty="0" smtClean="0"/>
-              <a:t>Data-driven;</a:t>
+              <a:t>Data-driven</a:t>
+            </a:r>
+            <a:r>
+              <a:rPr lang="en-US" dirty="0" smtClean="0"/>
+              <a:t>;</a:t>
             </a:r>
           </a:p>
           <a:p>
@@ -27805,10 +28739,59 @@
               <a:rPr lang="en-US" dirty="0" smtClean="0"/>
               <a:t>We explore the data-driven architecture to provide flexible player profiles, which helps to tailor the game without recompiling.</a:t>
             </a:r>
+          </a:p>
+          <a:p>
             <a:endParaRPr lang="en-US" dirty="0" smtClean="0"/>
           </a:p>
-          <a:p>
-            <a:endParaRPr lang="en-US" dirty="0" smtClean="0"/>
+        </p:txBody>
+      </p:sp>
+      <p:sp>
+        <p:nvSpPr>
+          <p:cNvPr id="5" name="TextBox 4"/>
+          <p:cNvSpPr txBox="1"/>
+          <p:nvPr/>
+        </p:nvSpPr>
+        <p:spPr>
+          <a:xfrm>
+            <a:off x="2679700" y="6464300"/>
+            <a:ext cx="9623468" cy="307777"/>
+          </a:xfrm>
+          <a:prstGeom prst="rect">
+            <a:avLst/>
+          </a:prstGeom>
+          <a:noFill/>
+        </p:spPr>
+        <p:txBody>
+          <a:bodyPr wrap="none" rtlCol="0">
+            <a:spAutoFit/>
+          </a:bodyPr>
+          <a:lstStyle/>
+          <a:p>
+            <a:r>
+              <a:rPr lang="en-US" sz="1400" dirty="0" smtClean="0"/>
+              <a:t>* For more information, please refer to &lt;</a:t>
+            </a:r>
+            <a:r>
+              <a:rPr lang="en-US" sz="1400" dirty="0" smtClean="0">
+                <a:hlinkClick r:id="rId2"/>
+              </a:rPr>
+              <a:t>http://www.mcshaffry.com/GameCode/</a:t>
+            </a:r>
+            <a:r>
+              <a:rPr lang="en-US" sz="1400" dirty="0" smtClean="0"/>
+              <a:t>&gt; and &lt;</a:t>
+            </a:r>
+            <a:r>
+              <a:rPr lang="en-US" sz="1400" dirty="0" smtClean="0">
+                <a:hlinkClick r:id="rId3"/>
+              </a:rPr>
+              <a:t>http://code.google.com/p/gamecode4/</a:t>
+            </a:r>
+            <a:r>
+              <a:rPr lang="en-US" sz="1400" dirty="0" smtClean="0"/>
+              <a:t>&gt;.</a:t>
+            </a:r>
+            <a:endParaRPr lang="en-US" sz="1400" dirty="0"/>
           </a:p>
         </p:txBody>
       </p:sp>
@@ -30631,6 +31614,138 @@
           </a:p>
         </p:txBody>
       </p:sp>
+      <p:sp>
+        <p:nvSpPr>
+          <p:cNvPr id="51" name="TextBox 50"/>
+          <p:cNvSpPr txBox="1"/>
+          <p:nvPr/>
+        </p:nvSpPr>
+        <p:spPr>
+          <a:xfrm>
+            <a:off x="1308100" y="1574800"/>
+            <a:ext cx="1384300" cy="369332"/>
+          </a:xfrm>
+          <a:prstGeom prst="rect">
+            <a:avLst/>
+          </a:prstGeom>
+          <a:noFill/>
+        </p:spPr>
+        <p:txBody>
+          <a:bodyPr wrap="square" rtlCol="0">
+            <a:spAutoFit/>
+          </a:bodyPr>
+          <a:lstStyle/>
+          <a:p>
+            <a:r>
+              <a:rPr lang="en-US" dirty="0"/>
+              <a:t>Game </a:t>
+            </a:r>
+            <a:r>
+              <a:rPr lang="en-US" dirty="0" smtClean="0"/>
+              <a:t>Logic</a:t>
+            </a:r>
+            <a:endParaRPr lang="en-US" dirty="0"/>
+          </a:p>
+        </p:txBody>
+      </p:sp>
+      <p:sp>
+        <p:nvSpPr>
+          <p:cNvPr id="52" name="TextBox 51"/>
+          <p:cNvSpPr txBox="1"/>
+          <p:nvPr/>
+        </p:nvSpPr>
+        <p:spPr>
+          <a:xfrm>
+            <a:off x="5403850" y="1574800"/>
+            <a:ext cx="1384300" cy="369332"/>
+          </a:xfrm>
+          <a:prstGeom prst="rect">
+            <a:avLst/>
+          </a:prstGeom>
+          <a:noFill/>
+        </p:spPr>
+        <p:txBody>
+          <a:bodyPr wrap="square" rtlCol="0">
+            <a:spAutoFit/>
+          </a:bodyPr>
+          <a:lstStyle/>
+          <a:p>
+            <a:r>
+              <a:rPr lang="en-US" dirty="0"/>
+              <a:t>Game </a:t>
+            </a:r>
+            <a:r>
+              <a:rPr lang="en-US" dirty="0" smtClean="0"/>
+              <a:t>View</a:t>
+            </a:r>
+            <a:endParaRPr lang="en-US" dirty="0"/>
+          </a:p>
+        </p:txBody>
+      </p:sp>
+      <p:sp>
+        <p:nvSpPr>
+          <p:cNvPr id="53" name="TextBox 52"/>
+          <p:cNvSpPr txBox="1"/>
+          <p:nvPr/>
+        </p:nvSpPr>
+        <p:spPr>
+          <a:xfrm>
+            <a:off x="9855200" y="1574800"/>
+            <a:ext cx="1384300" cy="369332"/>
+          </a:xfrm>
+          <a:prstGeom prst="rect">
+            <a:avLst/>
+          </a:prstGeom>
+          <a:noFill/>
+        </p:spPr>
+        <p:txBody>
+          <a:bodyPr wrap="square" rtlCol="0">
+            <a:spAutoFit/>
+          </a:bodyPr>
+          <a:lstStyle/>
+          <a:p>
+            <a:r>
+              <a:rPr lang="en-US" dirty="0" smtClean="0"/>
+              <a:t>User</a:t>
+            </a:r>
+            <a:endParaRPr lang="en-US" dirty="0"/>
+          </a:p>
+        </p:txBody>
+      </p:sp>
+      <p:sp>
+        <p:nvSpPr>
+          <p:cNvPr id="54" name="TextBox 53"/>
+          <p:cNvSpPr txBox="1"/>
+          <p:nvPr/>
+        </p:nvSpPr>
+        <p:spPr>
+          <a:xfrm>
+            <a:off x="1320799" y="6489700"/>
+            <a:ext cx="2099600" cy="369332"/>
+          </a:xfrm>
+          <a:prstGeom prst="rect">
+            <a:avLst/>
+          </a:prstGeom>
+          <a:noFill/>
+        </p:spPr>
+        <p:txBody>
+          <a:bodyPr wrap="square" rtlCol="0">
+            <a:spAutoFit/>
+          </a:bodyPr>
+          <a:lstStyle/>
+          <a:p>
+            <a:r>
+              <a:rPr lang="en-US" dirty="0"/>
+              <a:t>Game </a:t>
+            </a:r>
+            <a:r>
+              <a:rPr lang="en-US" dirty="0" smtClean="0"/>
+              <a:t>Application</a:t>
+            </a:r>
+            <a:endParaRPr lang="en-US" dirty="0"/>
+          </a:p>
+        </p:txBody>
+      </p:sp>
     </p:spTree>
     <p:extLst>
       <p:ext uri="{BB962C8B-B14F-4D97-AF65-F5344CB8AC3E}">
@@ -30895,11 +32010,7 @@
             </a:r>
             <a:r>
               <a:rPr lang="en-US" dirty="0" smtClean="0"/>
-              <a:t>Game Application</a:t>
-            </a:r>
-            <a:r>
-              <a:rPr lang="en-US" dirty="0" smtClean="0"/>
-              <a:t>.</a:t>
+              <a:t>Game Application.</a:t>
             </a:r>
           </a:p>
           <a:p>
@@ -30953,7 +32064,6 @@
               <a:rPr lang="en-US" dirty="0" smtClean="0"/>
               <a:t> in progress).</a:t>
             </a:r>
-            <a:endParaRPr lang="en-US" dirty="0" smtClean="0"/>
           </a:p>
           <a:p>
             <a:r>
@@ -32387,14 +33497,7 @@
                 <a:latin typeface="Consolas" panose="020B0609020204030204" pitchFamily="49" charset="0"/>
                 <a:cs typeface="Consolas" panose="020B0609020204030204" pitchFamily="49" charset="0"/>
               </a:rPr>
-              <a:t>(s</a:t>
-            </a:r>
-            <a:r>
-              <a:rPr lang="pt-BR" sz="2800" kern="1200" dirty="0" smtClean="0">
-                <a:latin typeface="Consolas" panose="020B0609020204030204" pitchFamily="49" charset="0"/>
-                <a:cs typeface="Consolas" panose="020B0609020204030204" pitchFamily="49" charset="0"/>
-              </a:rPr>
-              <a:t>)</a:t>
+              <a:t>(s)</a:t>
             </a:r>
             <a:endParaRPr lang="pt-BR" sz="2800" kern="1200" dirty="0">
               <a:latin typeface="Consolas" panose="020B0609020204030204" pitchFamily="49" charset="0"/>
@@ -33407,7 +34510,7 @@
         <p:spPr/>
         <p:txBody>
           <a:bodyPr>
-            <a:normAutofit fontScale="92500" lnSpcReduction="10000"/>
+            <a:normAutofit fontScale="92500" lnSpcReduction="20000"/>
           </a:bodyPr>
           <a:lstStyle/>
           <a:p>
@@ -33441,10 +34544,9 @@
               <a:t>https://github.com/francogarcia/uge-evaluation</a:t>
             </a:r>
             <a:r>
-              <a:rPr lang="en-US" dirty="0"/>
+              <a:rPr lang="en-US" dirty="0" smtClean="0"/>
               <a:t>&gt;.</a:t>
             </a:r>
-            <a:endParaRPr lang="en-US" dirty="0" smtClean="0"/>
           </a:p>
           <a:p>
             <a:r>
@@ -33461,11 +34563,7 @@
             </a:r>
             <a:r>
               <a:rPr lang="en-US" dirty="0" smtClean="0"/>
-              <a:t> source </a:t>
-            </a:r>
-            <a:r>
-              <a:rPr lang="en-US" dirty="0" smtClean="0"/>
-              <a:t>code.</a:t>
+              <a:t> source code.</a:t>
             </a:r>
           </a:p>
           <a:p>
@@ -33473,10 +34571,6 @@
             <a:r>
               <a:rPr lang="en-US" dirty="0" smtClean="0"/>
               <a:t>The code is available at: </a:t>
-            </a:r>
-            <a:r>
-              <a:rPr lang="en-US" dirty="0" smtClean="0"/>
-              <a:t>&lt;</a:t>
             </a:r>
             <a:r>
               <a:rPr lang="en-US" dirty="0" smtClean="0">
@@ -33492,18 +34586,29 @@
             </a:r>
             <a:r>
               <a:rPr lang="en-US" dirty="0" smtClean="0"/>
-              <a:t>&gt;.</a:t>
+              <a:t>;</a:t>
+            </a:r>
+          </a:p>
+          <a:p>
+            <a:pPr lvl="1"/>
+            <a:r>
+              <a:rPr lang="en-US" dirty="0" smtClean="0"/>
+              <a:t>It is a simple, quick prototype. However, it illustrates </a:t>
+            </a:r>
+            <a:r>
+              <a:rPr lang="en-US" dirty="0" err="1" smtClean="0"/>
+              <a:t>UGE’s</a:t>
+            </a:r>
+            <a:r>
+              <a:rPr lang="en-US" dirty="0" smtClean="0"/>
+              <a:t> run-time tailoring potential.</a:t>
             </a:r>
             <a:endParaRPr lang="en-US" dirty="0" smtClean="0"/>
           </a:p>
           <a:p>
             <a:r>
               <a:rPr lang="en-US" dirty="0" smtClean="0"/>
-              <a:t>The documentation describes an step by step tutorial to implement the prototype. This prototype is defined as suggest in this guide: with an IO-free Game Logic and player profiles to specialize the game to different interaction needs</a:t>
-            </a:r>
-            <a:r>
-              <a:rPr lang="en-US" dirty="0" smtClean="0"/>
-              <a:t>.</a:t>
+              <a:t>The documentation describes an step by step tutorial to implement the prototype. This prototype is defined as suggest in this guide: with an IO-free Game Logic and player profiles to specialize the game to different interaction needs.</a:t>
             </a:r>
           </a:p>
           <a:p>
@@ -33526,7 +34631,6 @@
               <a:rPr lang="en-US" dirty="0"/>
               <a:t>&gt;.</a:t>
             </a:r>
-            <a:endParaRPr lang="en-US" dirty="0"/>
           </a:p>
         </p:txBody>
       </p:sp>
@@ -34025,7 +35129,15 @@
                   <a:schemeClr val="tx1"/>
                 </a:solidFill>
               </a:rPr>
-              <a:t>The human who plays the game.</a:t>
+              <a:t>The human who plays the </a:t>
+            </a:r>
+            <a:r>
+              <a:rPr lang="en-US" sz="2000" dirty="0" smtClean="0">
+                <a:solidFill>
+                  <a:schemeClr val="tx1"/>
+                </a:solidFill>
+              </a:rPr>
+              <a:t>game</a:t>
             </a:r>
             <a:endParaRPr lang="en-US" sz="2000" dirty="0">
               <a:solidFill>
@@ -34120,7 +35232,30 @@
                   <a:schemeClr val="tx1"/>
                 </a:solidFill>
               </a:rPr>
-              <a:t>Game Logic</a:t>
+              <a:t>Game </a:t>
+            </a:r>
+            <a:r>
+              <a:rPr lang="en-US" sz="2400" b="1" dirty="0" smtClean="0">
+                <a:solidFill>
+                  <a:schemeClr val="tx1"/>
+                </a:solidFill>
+              </a:rPr>
+              <a:t>Logic</a:t>
+            </a:r>
+            <a:br>
+              <a:rPr lang="en-US" sz="2400" b="1" dirty="0" smtClean="0">
+                <a:solidFill>
+                  <a:schemeClr val="tx1"/>
+                </a:solidFill>
+              </a:rPr>
+            </a:br>
+            <a:r>
+              <a:rPr lang="en-US" sz="2400" dirty="0" smtClean="0">
+                <a:solidFill>
+                  <a:schemeClr val="tx1"/>
+                </a:solidFill>
+              </a:rPr>
+              <a:t>(Layer)</a:t>
             </a:r>
             <a:r>
               <a:rPr lang="en-US" sz="2000" dirty="0" smtClean="0">
@@ -34223,7 +35358,30 @@
                   <a:schemeClr val="tx1"/>
                 </a:solidFill>
               </a:rPr>
-              <a:t>Game View</a:t>
+              <a:t>Game </a:t>
+            </a:r>
+            <a:r>
+              <a:rPr lang="en-US" sz="2400" b="1" dirty="0" smtClean="0">
+                <a:solidFill>
+                  <a:schemeClr val="tx1"/>
+                </a:solidFill>
+              </a:rPr>
+              <a:t>View</a:t>
+            </a:r>
+            <a:br>
+              <a:rPr lang="en-US" sz="2400" b="1" dirty="0" smtClean="0">
+                <a:solidFill>
+                  <a:schemeClr val="tx1"/>
+                </a:solidFill>
+              </a:rPr>
+            </a:br>
+            <a:r>
+              <a:rPr lang="en-US" sz="2400" dirty="0" smtClean="0">
+                <a:solidFill>
+                  <a:schemeClr val="tx1"/>
+                </a:solidFill>
+              </a:rPr>
+              <a:t>(Layer)</a:t>
             </a:r>
             <a:r>
               <a:rPr lang="en-US" sz="2000" dirty="0" smtClean="0">
@@ -34280,7 +35438,7 @@
         <p:spPr>
           <a:xfrm>
             <a:off x="2376506" y="5830838"/>
-            <a:ext cx="3771995" cy="769441"/>
+            <a:ext cx="3598999" cy="769441"/>
           </a:xfrm>
           <a:prstGeom prst="rect">
             <a:avLst/>
@@ -34302,6 +35460,18 @@
               <a:t>Application</a:t>
             </a:r>
             <a:r>
+              <a:rPr lang="pt-BR" sz="2400" dirty="0" smtClean="0"/>
+              <a:t> (</a:t>
+            </a:r>
+            <a:r>
+              <a:rPr lang="pt-BR" sz="2400" dirty="0" err="1" smtClean="0"/>
+              <a:t>Layer</a:t>
+            </a:r>
+            <a:r>
+              <a:rPr lang="pt-BR" sz="2400" dirty="0" smtClean="0"/>
+              <a:t>)</a:t>
+            </a:r>
+            <a:r>
               <a:rPr lang="pt-BR" sz="2400" b="1" dirty="0" smtClean="0"/>
               <a:t/>
             </a:r>
@@ -34339,10 +35509,6 @@
             <a:r>
               <a:rPr lang="pt-BR" sz="2000" dirty="0" err="1" smtClean="0"/>
               <a:t>user</a:t>
-            </a:r>
-            <a:r>
-              <a:rPr lang="pt-BR" sz="2000" dirty="0" smtClean="0"/>
-              <a:t>.</a:t>
             </a:r>
             <a:endParaRPr lang="pt-BR" sz="2400" dirty="0"/>
           </a:p>
@@ -34557,6 +35723,104 @@
             <a:r>
               <a:rPr lang="en-US" dirty="0" smtClean="0"/>
               <a:t>Game World</a:t>
+            </a:r>
+            <a:endParaRPr lang="en-US" dirty="0"/>
+          </a:p>
+        </p:txBody>
+      </p:sp>
+      <p:sp>
+        <p:nvSpPr>
+          <p:cNvPr id="3" name="TextBox 2"/>
+          <p:cNvSpPr txBox="1"/>
+          <p:nvPr/>
+        </p:nvSpPr>
+        <p:spPr>
+          <a:xfrm>
+            <a:off x="1308100" y="1574800"/>
+            <a:ext cx="1384300" cy="369332"/>
+          </a:xfrm>
+          <a:prstGeom prst="rect">
+            <a:avLst/>
+          </a:prstGeom>
+          <a:noFill/>
+        </p:spPr>
+        <p:txBody>
+          <a:bodyPr wrap="square" rtlCol="0">
+            <a:spAutoFit/>
+          </a:bodyPr>
+          <a:lstStyle/>
+          <a:p>
+            <a:r>
+              <a:rPr lang="en-US" dirty="0"/>
+              <a:t>Game </a:t>
+            </a:r>
+            <a:r>
+              <a:rPr lang="en-US" dirty="0" smtClean="0"/>
+              <a:t>Logic</a:t>
+            </a:r>
+            <a:endParaRPr lang="en-US" dirty="0"/>
+          </a:p>
+        </p:txBody>
+      </p:sp>
+      <p:sp>
+        <p:nvSpPr>
+          <p:cNvPr id="8" name="TextBox 7"/>
+          <p:cNvSpPr txBox="1"/>
+          <p:nvPr/>
+        </p:nvSpPr>
+        <p:spPr>
+          <a:xfrm>
+            <a:off x="5403850" y="1574800"/>
+            <a:ext cx="1384300" cy="369332"/>
+          </a:xfrm>
+          <a:prstGeom prst="rect">
+            <a:avLst/>
+          </a:prstGeom>
+          <a:noFill/>
+        </p:spPr>
+        <p:txBody>
+          <a:bodyPr wrap="square" rtlCol="0">
+            <a:spAutoFit/>
+          </a:bodyPr>
+          <a:lstStyle/>
+          <a:p>
+            <a:r>
+              <a:rPr lang="en-US" dirty="0"/>
+              <a:t>Game </a:t>
+            </a:r>
+            <a:r>
+              <a:rPr lang="en-US" dirty="0" smtClean="0"/>
+              <a:t>View</a:t>
+            </a:r>
+            <a:endParaRPr lang="en-US" dirty="0"/>
+          </a:p>
+        </p:txBody>
+      </p:sp>
+      <p:sp>
+        <p:nvSpPr>
+          <p:cNvPr id="9" name="TextBox 8"/>
+          <p:cNvSpPr txBox="1"/>
+          <p:nvPr/>
+        </p:nvSpPr>
+        <p:spPr>
+          <a:xfrm>
+            <a:off x="9855200" y="1574800"/>
+            <a:ext cx="1384300" cy="369332"/>
+          </a:xfrm>
+          <a:prstGeom prst="rect">
+            <a:avLst/>
+          </a:prstGeom>
+          <a:noFill/>
+        </p:spPr>
+        <p:txBody>
+          <a:bodyPr wrap="square" rtlCol="0">
+            <a:spAutoFit/>
+          </a:bodyPr>
+          <a:lstStyle/>
+          <a:p>
+            <a:r>
+              <a:rPr lang="en-US" dirty="0" smtClean="0"/>
+              <a:t>User</a:t>
             </a:r>
             <a:endParaRPr lang="en-US" dirty="0"/>
           </a:p>

</xml_diff>

<commit_message>
Inserted an image to illustrate the results.
</commit_message>
<xml_diff>
--- a/doc/UGE in a Nutshell.pptx
+++ b/doc/UGE in a Nutshell.pptx
@@ -5,7 +5,7 @@
     <p:sldMasterId id="2147483648" r:id="rId1"/>
   </p:sldMasterIdLst>
   <p:notesMasterIdLst>
-    <p:notesMasterId r:id="rId58"/>
+    <p:notesMasterId r:id="rId59"/>
   </p:notesMasterIdLst>
   <p:sldIdLst>
     <p:sldId id="260" r:id="rId2"/>
@@ -60,10 +60,11 @@
     <p:sldId id="339" r:id="rId51"/>
     <p:sldId id="340" r:id="rId52"/>
     <p:sldId id="338" r:id="rId53"/>
-    <p:sldId id="322" r:id="rId54"/>
-    <p:sldId id="323" r:id="rId55"/>
-    <p:sldId id="342" r:id="rId56"/>
-    <p:sldId id="309" r:id="rId57"/>
+    <p:sldId id="343" r:id="rId54"/>
+    <p:sldId id="322" r:id="rId55"/>
+    <p:sldId id="323" r:id="rId56"/>
+    <p:sldId id="342" r:id="rId57"/>
+    <p:sldId id="309" r:id="rId58"/>
   </p:sldIdLst>
   <p:sldSz cx="12192000" cy="6858000"/>
   <p:notesSz cx="6858000" cy="9144000"/>
@@ -264,7 +265,7 @@
           <a:p>
             <a:fld id="{5FE3FB01-6CAF-4297-A2E9-F284635E1C45}" type="datetimeFigureOut">
               <a:rPr lang="pt-BR" smtClean="0"/>
-              <a:t>04/04/2014</a:t>
+              <a:t>05/04/2014</a:t>
             </a:fld>
             <a:endParaRPr lang="pt-BR"/>
           </a:p>
@@ -700,6 +701,90 @@
 </p:notes>
 </file>
 
+<file path=ppt/notesSlides/notesSlide3.xml><?xml version="1.0" encoding="utf-8"?>
+<p:notes xmlns:a="http://schemas.openxmlformats.org/drawingml/2006/main" xmlns:r="http://schemas.openxmlformats.org/officeDocument/2006/relationships" xmlns:p="http://schemas.openxmlformats.org/presentationml/2006/main">
+  <p:cSld>
+    <p:spTree>
+      <p:nvGrpSpPr>
+        <p:cNvPr id="1" name=""/>
+        <p:cNvGrpSpPr/>
+        <p:nvPr/>
+      </p:nvGrpSpPr>
+      <p:grpSpPr>
+        <a:xfrm>
+          <a:off x="0" y="0"/>
+          <a:ext cx="0" cy="0"/>
+          <a:chOff x="0" y="0"/>
+          <a:chExt cx="0" cy="0"/>
+        </a:xfrm>
+      </p:grpSpPr>
+      <p:sp>
+        <p:nvSpPr>
+          <p:cNvPr id="2" name="Slide Image Placeholder 1"/>
+          <p:cNvSpPr>
+            <a:spLocks noGrp="1" noRot="1" noChangeAspect="1"/>
+          </p:cNvSpPr>
+          <p:nvPr>
+            <p:ph type="sldImg"/>
+          </p:nvPr>
+        </p:nvSpPr>
+        <p:spPr/>
+      </p:sp>
+      <p:sp>
+        <p:nvSpPr>
+          <p:cNvPr id="3" name="Notes Placeholder 2"/>
+          <p:cNvSpPr>
+            <a:spLocks noGrp="1"/>
+          </p:cNvSpPr>
+          <p:nvPr>
+            <p:ph type="body" idx="1"/>
+          </p:nvPr>
+        </p:nvSpPr>
+        <p:spPr/>
+        <p:txBody>
+          <a:bodyPr/>
+          <a:lstStyle/>
+          <a:p>
+            <a:endParaRPr lang="pt-BR" dirty="0"/>
+          </a:p>
+        </p:txBody>
+      </p:sp>
+      <p:sp>
+        <p:nvSpPr>
+          <p:cNvPr id="4" name="Slide Number Placeholder 3"/>
+          <p:cNvSpPr>
+            <a:spLocks noGrp="1"/>
+          </p:cNvSpPr>
+          <p:nvPr>
+            <p:ph type="sldNum" sz="quarter" idx="10"/>
+          </p:nvPr>
+        </p:nvSpPr>
+        <p:spPr/>
+        <p:txBody>
+          <a:bodyPr/>
+          <a:lstStyle/>
+          <a:p>
+            <a:fld id="{CAB2D3DF-EDE5-4951-8B49-04BCFAB4AF9D}" type="slidenum">
+              <a:rPr lang="pt-BR" smtClean="0"/>
+              <a:t>53</a:t>
+            </a:fld>
+            <a:endParaRPr lang="pt-BR"/>
+          </a:p>
+        </p:txBody>
+      </p:sp>
+    </p:spTree>
+    <p:extLst>
+      <p:ext uri="{BB962C8B-B14F-4D97-AF65-F5344CB8AC3E}">
+        <p14:creationId xmlns:p14="http://schemas.microsoft.com/office/powerpoint/2010/main" val="1450834055"/>
+      </p:ext>
+    </p:extLst>
+  </p:cSld>
+  <p:clrMapOvr>
+    <a:masterClrMapping/>
+  </p:clrMapOvr>
+</p:notes>
+</file>
+
 <file path=ppt/slideLayouts/slideLayout1.xml><?xml version="1.0" encoding="utf-8"?>
 <p:sldLayout xmlns:a="http://schemas.openxmlformats.org/drawingml/2006/main" xmlns:r="http://schemas.openxmlformats.org/officeDocument/2006/relationships" xmlns:p="http://schemas.openxmlformats.org/presentationml/2006/main" type="title" preserve="1">
   <p:cSld name="Title Slide">
@@ -831,7 +916,7 @@
           <a:p>
             <a:fld id="{56FD282B-E124-48AC-913F-24863A53ADE1}" type="datetimeFigureOut">
               <a:rPr lang="pt-BR" smtClean="0"/>
-              <a:t>04/04/2014</a:t>
+              <a:t>05/04/2014</a:t>
             </a:fld>
             <a:endParaRPr lang="pt-BR"/>
           </a:p>
@@ -1001,7 +1086,7 @@
           <a:p>
             <a:fld id="{56FD282B-E124-48AC-913F-24863A53ADE1}" type="datetimeFigureOut">
               <a:rPr lang="pt-BR" smtClean="0"/>
-              <a:t>04/04/2014</a:t>
+              <a:t>05/04/2014</a:t>
             </a:fld>
             <a:endParaRPr lang="pt-BR"/>
           </a:p>
@@ -1181,7 +1266,7 @@
           <a:p>
             <a:fld id="{56FD282B-E124-48AC-913F-24863A53ADE1}" type="datetimeFigureOut">
               <a:rPr lang="pt-BR" smtClean="0"/>
-              <a:t>04/04/2014</a:t>
+              <a:t>05/04/2014</a:t>
             </a:fld>
             <a:endParaRPr lang="pt-BR"/>
           </a:p>
@@ -1351,7 +1436,7 @@
           <a:p>
             <a:fld id="{56FD282B-E124-48AC-913F-24863A53ADE1}" type="datetimeFigureOut">
               <a:rPr lang="pt-BR" smtClean="0"/>
-              <a:t>04/04/2014</a:t>
+              <a:t>05/04/2014</a:t>
             </a:fld>
             <a:endParaRPr lang="pt-BR"/>
           </a:p>
@@ -1597,7 +1682,7 @@
           <a:p>
             <a:fld id="{56FD282B-E124-48AC-913F-24863A53ADE1}" type="datetimeFigureOut">
               <a:rPr lang="pt-BR" smtClean="0"/>
-              <a:t>04/04/2014</a:t>
+              <a:t>05/04/2014</a:t>
             </a:fld>
             <a:endParaRPr lang="pt-BR"/>
           </a:p>
@@ -1829,7 +1914,7 @@
           <a:p>
             <a:fld id="{56FD282B-E124-48AC-913F-24863A53ADE1}" type="datetimeFigureOut">
               <a:rPr lang="pt-BR" smtClean="0"/>
-              <a:t>04/04/2014</a:t>
+              <a:t>05/04/2014</a:t>
             </a:fld>
             <a:endParaRPr lang="pt-BR"/>
           </a:p>
@@ -2196,7 +2281,7 @@
           <a:p>
             <a:fld id="{56FD282B-E124-48AC-913F-24863A53ADE1}" type="datetimeFigureOut">
               <a:rPr lang="pt-BR" smtClean="0"/>
-              <a:t>04/04/2014</a:t>
+              <a:t>05/04/2014</a:t>
             </a:fld>
             <a:endParaRPr lang="pt-BR"/>
           </a:p>
@@ -2314,7 +2399,7 @@
           <a:p>
             <a:fld id="{56FD282B-E124-48AC-913F-24863A53ADE1}" type="datetimeFigureOut">
               <a:rPr lang="pt-BR" smtClean="0"/>
-              <a:t>04/04/2014</a:t>
+              <a:t>05/04/2014</a:t>
             </a:fld>
             <a:endParaRPr lang="pt-BR"/>
           </a:p>
@@ -2409,7 +2494,7 @@
           <a:p>
             <a:fld id="{56FD282B-E124-48AC-913F-24863A53ADE1}" type="datetimeFigureOut">
               <a:rPr lang="pt-BR" smtClean="0"/>
-              <a:t>04/04/2014</a:t>
+              <a:t>05/04/2014</a:t>
             </a:fld>
             <a:endParaRPr lang="pt-BR"/>
           </a:p>
@@ -2686,7 +2771,7 @@
           <a:p>
             <a:fld id="{56FD282B-E124-48AC-913F-24863A53ADE1}" type="datetimeFigureOut">
               <a:rPr lang="pt-BR" smtClean="0"/>
-              <a:t>04/04/2014</a:t>
+              <a:t>05/04/2014</a:t>
             </a:fld>
             <a:endParaRPr lang="pt-BR"/>
           </a:p>
@@ -2939,7 +3024,7 @@
           <a:p>
             <a:fld id="{56FD282B-E124-48AC-913F-24863A53ADE1}" type="datetimeFigureOut">
               <a:rPr lang="pt-BR" smtClean="0"/>
-              <a:t>04/04/2014</a:t>
+              <a:t>05/04/2014</a:t>
             </a:fld>
             <a:endParaRPr lang="pt-BR"/>
           </a:p>
@@ -3152,7 +3237,7 @@
           <a:p>
             <a:fld id="{56FD282B-E124-48AC-913F-24863A53ADE1}" type="datetimeFigureOut">
               <a:rPr lang="pt-BR" smtClean="0"/>
-              <a:t>04/04/2014</a:t>
+              <a:t>05/04/2014</a:t>
             </a:fld>
             <a:endParaRPr lang="pt-BR"/>
           </a:p>
@@ -10468,11 +10553,7 @@
             <a:pPr lvl="1"/>
             <a:r>
               <a:rPr lang="en-US" dirty="0" smtClean="0"/>
-              <a:t>Artificial Intelligence (AI) </a:t>
-            </a:r>
-            <a:r>
-              <a:rPr lang="en-US" dirty="0" smtClean="0"/>
-              <a:t>actors can send game commands;</a:t>
+              <a:t>Artificial Intelligence (AI) actors can send game commands;</a:t>
             </a:r>
           </a:p>
           <a:p>
@@ -19280,11 +19361,7 @@
             <a:pPr lvl="1"/>
             <a:r>
               <a:rPr lang="en-US" dirty="0" smtClean="0"/>
-              <a:t>AI controlled </a:t>
-            </a:r>
-            <a:r>
-              <a:rPr lang="en-US" dirty="0" smtClean="0"/>
-              <a:t>helpers.</a:t>
+              <a:t>AI controlled helpers.</a:t>
             </a:r>
           </a:p>
           <a:p>
@@ -19620,7 +19697,7 @@
           <a:graphicData uri="http://schemas.openxmlformats.org/presentationml/2006/ole">
             <mc:AlternateContent xmlns:mc="http://schemas.openxmlformats.org/markup-compatibility/2006">
               <mc:Choice xmlns:v="urn:schemas-microsoft-com:vml" Requires="v">
-                <p:oleObj spid="_x0000_s1091" name="Visio" r:id="rId3" imgW="5981700" imgH="2695485" progId="Visio.Drawing.15">
+                <p:oleObj spid="_x0000_s1097" name="Visio" r:id="rId3" imgW="5981700" imgH="2695485" progId="Visio.Drawing.15">
                   <p:embed/>
                 </p:oleObj>
               </mc:Choice>
@@ -19759,7 +19836,7 @@
           <a:graphicData uri="http://schemas.openxmlformats.org/presentationml/2006/ole">
             <mc:AlternateContent xmlns:mc="http://schemas.openxmlformats.org/markup-compatibility/2006">
               <mc:Choice xmlns:v="urn:schemas-microsoft-com:vml" Requires="v">
-                <p:oleObj spid="_x0000_s1092" name="Visio" r:id="rId5" imgW="5943600" imgH="2695485" progId="Visio.Drawing.15">
+                <p:oleObj spid="_x0000_s1098" name="Visio" r:id="rId5" imgW="5943600" imgH="2695485" progId="Visio.Drawing.15">
                   <p:embed/>
                 </p:oleObj>
               </mc:Choice>
@@ -19898,7 +19975,7 @@
           <a:graphicData uri="http://schemas.openxmlformats.org/presentationml/2006/ole">
             <mc:AlternateContent xmlns:mc="http://schemas.openxmlformats.org/markup-compatibility/2006">
               <mc:Choice xmlns:v="urn:schemas-microsoft-com:vml" Requires="v">
-                <p:oleObj spid="_x0000_s1093" name="Visio" r:id="rId7" imgW="5981700" imgH="3591015" progId="Visio.Drawing.15">
+                <p:oleObj spid="_x0000_s1099" name="Visio" r:id="rId7" imgW="5981700" imgH="3591015" progId="Visio.Drawing.15">
                   <p:embed/>
                 </p:oleObj>
               </mc:Choice>
@@ -22520,15 +22597,7 @@
           <a:p>
             <a:r>
               <a:rPr lang="en-US" dirty="0" smtClean="0"/>
-              <a:t>The Game Logic is event-driven. This mean the game implementation has already several existing events </a:t>
-            </a:r>
-            <a:r>
-              <a:rPr lang="en-US" dirty="0" smtClean="0"/>
-              <a:t>that </a:t>
-            </a:r>
-            <a:r>
-              <a:rPr lang="en-US" dirty="0" smtClean="0"/>
-              <a:t>can be handled to provide feedback.</a:t>
+              <a:t>The Game Logic is event-driven. This mean the game implementation has already several existing events that can be handled to provide feedback.</a:t>
             </a:r>
           </a:p>
           <a:p>
@@ -28676,11 +28745,7 @@
             </a:r>
             <a:r>
               <a:rPr lang="en-US" dirty="0" smtClean="0"/>
-              <a:t>flexibility and adaptability</a:t>
-            </a:r>
-            <a:r>
-              <a:rPr lang="en-US" dirty="0" smtClean="0"/>
-              <a:t>.</a:t>
+              <a:t>flexibility and adaptability.</a:t>
             </a:r>
           </a:p>
           <a:p>
@@ -28701,7 +28766,6 @@
               <a:rPr lang="en-US" dirty="0" smtClean="0"/>
               <a:t> and Graham’s GCC4 engine* to create a coherent engine for run-time tailoring.</a:t>
             </a:r>
-            <a:endParaRPr lang="en-US" dirty="0" smtClean="0"/>
           </a:p>
           <a:p>
             <a:r>
@@ -28713,11 +28777,7 @@
             <a:pPr lvl="1"/>
             <a:r>
               <a:rPr lang="en-US" dirty="0" smtClean="0"/>
-              <a:t>Data-driven</a:t>
-            </a:r>
-            <a:r>
-              <a:rPr lang="en-US" dirty="0" smtClean="0"/>
-              <a:t>;</a:t>
+              <a:t>Data-driven;</a:t>
             </a:r>
           </a:p>
           <a:p>
@@ -29593,6 +29653,376 @@
 </file>
 
 <file path=ppt/slides/slide53.xml><?xml version="1.0" encoding="utf-8"?>
+<p:sld xmlns:a="http://schemas.openxmlformats.org/drawingml/2006/main" xmlns:r="http://schemas.openxmlformats.org/officeDocument/2006/relationships" xmlns:p="http://schemas.openxmlformats.org/presentationml/2006/main">
+  <p:cSld>
+    <p:spTree>
+      <p:nvGrpSpPr>
+        <p:cNvPr id="1" name=""/>
+        <p:cNvGrpSpPr/>
+        <p:nvPr/>
+      </p:nvGrpSpPr>
+      <p:grpSpPr>
+        <a:xfrm>
+          <a:off x="0" y="0"/>
+          <a:ext cx="0" cy="0"/>
+          <a:chOff x="0" y="0"/>
+          <a:chExt cx="0" cy="0"/>
+        </a:xfrm>
+      </p:grpSpPr>
+      <p:sp>
+        <p:nvSpPr>
+          <p:cNvPr id="4" name="Oval 3"/>
+          <p:cNvSpPr/>
+          <p:nvPr/>
+        </p:nvSpPr>
+        <p:spPr>
+          <a:xfrm>
+            <a:off x="0" y="2120900"/>
+            <a:ext cx="3987800" cy="3873500"/>
+          </a:xfrm>
+          <a:prstGeom prst="ellipse">
+            <a:avLst/>
+          </a:prstGeom>
+          <a:solidFill>
+            <a:schemeClr val="accent1">
+              <a:alpha val="20000"/>
+            </a:schemeClr>
+          </a:solidFill>
+          <a:ln>
+            <a:noFill/>
+          </a:ln>
+          <a:effectLst>
+            <a:softEdge rad="317500"/>
+          </a:effectLst>
+        </p:spPr>
+        <p:style>
+          <a:lnRef idx="2">
+            <a:schemeClr val="accent1">
+              <a:shade val="50000"/>
+            </a:schemeClr>
+          </a:lnRef>
+          <a:fillRef idx="1">
+            <a:schemeClr val="accent1"/>
+          </a:fillRef>
+          <a:effectRef idx="0">
+            <a:schemeClr val="accent1"/>
+          </a:effectRef>
+          <a:fontRef idx="minor">
+            <a:schemeClr val="lt1"/>
+          </a:fontRef>
+        </p:style>
+        <p:txBody>
+          <a:bodyPr rtlCol="0" anchor="ctr"/>
+          <a:lstStyle/>
+          <a:p>
+            <a:pPr algn="ctr"/>
+            <a:endParaRPr lang="en-US" dirty="0">
+              <a:solidFill>
+                <a:schemeClr val="tx1"/>
+              </a:solidFill>
+            </a:endParaRPr>
+          </a:p>
+        </p:txBody>
+      </p:sp>
+      <p:sp>
+        <p:nvSpPr>
+          <p:cNvPr id="6" name="Oval 5"/>
+          <p:cNvSpPr/>
+          <p:nvPr/>
+        </p:nvSpPr>
+        <p:spPr>
+          <a:xfrm>
+            <a:off x="4102100" y="2120900"/>
+            <a:ext cx="3987800" cy="3873500"/>
+          </a:xfrm>
+          <a:prstGeom prst="ellipse">
+            <a:avLst/>
+          </a:prstGeom>
+          <a:solidFill>
+            <a:schemeClr val="accent2">
+              <a:lumMod val="40000"/>
+              <a:lumOff val="60000"/>
+              <a:alpha val="20000"/>
+            </a:schemeClr>
+          </a:solidFill>
+          <a:ln>
+            <a:noFill/>
+          </a:ln>
+          <a:effectLst>
+            <a:softEdge rad="317500"/>
+          </a:effectLst>
+        </p:spPr>
+        <p:style>
+          <a:lnRef idx="2">
+            <a:schemeClr val="accent1">
+              <a:shade val="50000"/>
+            </a:schemeClr>
+          </a:lnRef>
+          <a:fillRef idx="1">
+            <a:schemeClr val="accent1"/>
+          </a:fillRef>
+          <a:effectRef idx="0">
+            <a:schemeClr val="accent1"/>
+          </a:effectRef>
+          <a:fontRef idx="minor">
+            <a:schemeClr val="lt1"/>
+          </a:fontRef>
+        </p:style>
+        <p:txBody>
+          <a:bodyPr rtlCol="0" anchor="ctr"/>
+          <a:lstStyle/>
+          <a:p>
+            <a:pPr algn="ctr"/>
+            <a:endParaRPr lang="en-US" dirty="0">
+              <a:solidFill>
+                <a:schemeClr val="tx1"/>
+              </a:solidFill>
+            </a:endParaRPr>
+          </a:p>
+        </p:txBody>
+      </p:sp>
+      <p:sp>
+        <p:nvSpPr>
+          <p:cNvPr id="7" name="Oval 6"/>
+          <p:cNvSpPr/>
+          <p:nvPr/>
+        </p:nvSpPr>
+        <p:spPr>
+          <a:xfrm>
+            <a:off x="8204200" y="2076450"/>
+            <a:ext cx="3987800" cy="3873500"/>
+          </a:xfrm>
+          <a:prstGeom prst="ellipse">
+            <a:avLst/>
+          </a:prstGeom>
+          <a:solidFill>
+            <a:schemeClr val="accent6">
+              <a:lumMod val="40000"/>
+              <a:lumOff val="60000"/>
+              <a:alpha val="20000"/>
+            </a:schemeClr>
+          </a:solidFill>
+          <a:ln>
+            <a:noFill/>
+          </a:ln>
+          <a:effectLst>
+            <a:softEdge rad="317500"/>
+          </a:effectLst>
+        </p:spPr>
+        <p:style>
+          <a:lnRef idx="2">
+            <a:schemeClr val="accent1">
+              <a:shade val="50000"/>
+            </a:schemeClr>
+          </a:lnRef>
+          <a:fillRef idx="1">
+            <a:schemeClr val="accent1"/>
+          </a:fillRef>
+          <a:effectRef idx="0">
+            <a:schemeClr val="accent1"/>
+          </a:effectRef>
+          <a:fontRef idx="minor">
+            <a:schemeClr val="lt1"/>
+          </a:fontRef>
+        </p:style>
+        <p:txBody>
+          <a:bodyPr rtlCol="0" anchor="ctr"/>
+          <a:lstStyle/>
+          <a:p>
+            <a:pPr algn="ctr"/>
+            <a:endParaRPr lang="en-US" dirty="0">
+              <a:solidFill>
+                <a:schemeClr val="tx1"/>
+              </a:solidFill>
+            </a:endParaRPr>
+          </a:p>
+        </p:txBody>
+      </p:sp>
+      <p:sp>
+        <p:nvSpPr>
+          <p:cNvPr id="2" name="Title 1"/>
+          <p:cNvSpPr>
+            <a:spLocks noGrp="1"/>
+          </p:cNvSpPr>
+          <p:nvPr>
+            <p:ph type="title"/>
+          </p:nvPr>
+        </p:nvSpPr>
+        <p:spPr/>
+        <p:txBody>
+          <a:bodyPr/>
+          <a:lstStyle/>
+          <a:p>
+            <a:pPr algn="ctr"/>
+            <a:r>
+              <a:rPr lang="en-US" dirty="0" smtClean="0"/>
+              <a:t>Player </a:t>
+            </a:r>
+            <a:r>
+              <a:rPr lang="en-US" dirty="0"/>
+              <a:t>Profile Specialization</a:t>
+            </a:r>
+          </a:p>
+        </p:txBody>
+      </p:sp>
+      <p:sp>
+        <p:nvSpPr>
+          <p:cNvPr id="12" name="Content Placeholder 11"/>
+          <p:cNvSpPr>
+            <a:spLocks noGrp="1"/>
+          </p:cNvSpPr>
+          <p:nvPr>
+            <p:ph sz="half" idx="2"/>
+          </p:nvPr>
+        </p:nvSpPr>
+        <p:spPr/>
+        <p:txBody>
+          <a:bodyPr/>
+          <a:lstStyle/>
+          <a:p>
+            <a:pPr marL="514350" indent="-514350">
+              <a:buFont typeface="+mj-lt"/>
+              <a:buAutoNum type="arabicPeriod"/>
+            </a:pPr>
+            <a:r>
+              <a:rPr lang="en-US" dirty="0" smtClean="0"/>
+              <a:t>Average User Profile</a:t>
+            </a:r>
+          </a:p>
+          <a:p>
+            <a:pPr lvl="1"/>
+            <a:r>
+              <a:rPr lang="en-US" dirty="0" smtClean="0"/>
+              <a:t>Event-driven regular game implementation.</a:t>
+            </a:r>
+          </a:p>
+          <a:p>
+            <a:pPr marL="514350" indent="-514350">
+              <a:buFont typeface="+mj-lt"/>
+              <a:buAutoNum type="arabicPeriod"/>
+            </a:pPr>
+            <a:r>
+              <a:rPr lang="en-US" dirty="0" smtClean="0"/>
+              <a:t>Low Vision User Profile</a:t>
+            </a:r>
+          </a:p>
+          <a:p>
+            <a:pPr lvl="1"/>
+            <a:r>
+              <a:rPr lang="en-US" dirty="0" smtClean="0"/>
+              <a:t>Extra-large graphics.</a:t>
+            </a:r>
+          </a:p>
+          <a:p>
+            <a:pPr marL="514350" indent="-514350">
+              <a:buFont typeface="+mj-lt"/>
+              <a:buAutoNum type="arabicPeriod"/>
+            </a:pPr>
+            <a:r>
+              <a:rPr lang="en-US" dirty="0" smtClean="0"/>
+              <a:t>Motor Impairment User Profile</a:t>
+            </a:r>
+          </a:p>
+          <a:p>
+            <a:pPr lvl="1"/>
+            <a:r>
+              <a:rPr lang="en-US" dirty="0" smtClean="0"/>
+              <a:t>Automatic controls.</a:t>
+            </a:r>
+          </a:p>
+          <a:p>
+            <a:pPr marL="514350" indent="-514350">
+              <a:buFont typeface="+mj-lt"/>
+              <a:buAutoNum type="arabicPeriod"/>
+            </a:pPr>
+            <a:r>
+              <a:rPr lang="en-US" dirty="0" smtClean="0"/>
+              <a:t>Blind User Profile</a:t>
+            </a:r>
+          </a:p>
+          <a:p>
+            <a:pPr lvl="1"/>
+            <a:r>
+              <a:rPr lang="en-US" dirty="0" smtClean="0"/>
+              <a:t>Audio-only user interface.</a:t>
+            </a:r>
+            <a:endParaRPr lang="en-US" dirty="0"/>
+          </a:p>
+        </p:txBody>
+      </p:sp>
+      <p:sp>
+        <p:nvSpPr>
+          <p:cNvPr id="8" name="TextBox 7"/>
+          <p:cNvSpPr txBox="1"/>
+          <p:nvPr/>
+        </p:nvSpPr>
+        <p:spPr>
+          <a:xfrm>
+            <a:off x="9363075" y="2076450"/>
+            <a:ext cx="1543050" cy="447675"/>
+          </a:xfrm>
+          <a:prstGeom prst="rect">
+            <a:avLst/>
+          </a:prstGeom>
+          <a:noFill/>
+        </p:spPr>
+        <p:txBody>
+          <a:bodyPr wrap="square" rtlCol="0">
+            <a:spAutoFit/>
+          </a:bodyPr>
+          <a:lstStyle/>
+          <a:p>
+            <a:endParaRPr lang="pt-BR" dirty="0"/>
+          </a:p>
+        </p:txBody>
+      </p:sp>
+      <p:pic>
+        <p:nvPicPr>
+          <p:cNvPr id="15" name="Content Placeholder 14"/>
+          <p:cNvPicPr>
+            <a:picLocks noGrp="1" noChangeAspect="1"/>
+          </p:cNvPicPr>
+          <p:nvPr>
+            <p:ph sz="half" idx="1"/>
+          </p:nvPr>
+        </p:nvPicPr>
+        <p:blipFill>
+          <a:blip r:embed="rId3"/>
+          <a:stretch>
+            <a:fillRect/>
+          </a:stretch>
+        </p:blipFill>
+        <p:spPr>
+          <a:xfrm>
+            <a:off x="966155" y="1825625"/>
+            <a:ext cx="4925690" cy="4351338"/>
+          </a:xfrm>
+          <a:prstGeom prst="rect">
+            <a:avLst/>
+          </a:prstGeom>
+        </p:spPr>
+      </p:pic>
+    </p:spTree>
+    <p:extLst>
+      <p:ext uri="{BB962C8B-B14F-4D97-AF65-F5344CB8AC3E}">
+        <p14:creationId xmlns:p14="http://schemas.microsoft.com/office/powerpoint/2010/main" val="1459362094"/>
+      </p:ext>
+    </p:extLst>
+  </p:cSld>
+  <p:clrMapOvr>
+    <a:masterClrMapping/>
+  </p:clrMapOvr>
+  <p:timing>
+    <p:tnLst>
+      <p:par>
+        <p:cTn id="1" dur="indefinite" restart="never" nodeType="tmRoot"/>
+      </p:par>
+    </p:tnLst>
+  </p:timing>
+</p:sld>
+</file>
+
+<file path=ppt/slides/slide54.xml><?xml version="1.0" encoding="utf-8"?>
 <p:sld xmlns:a="http://schemas.openxmlformats.org/drawingml/2006/main" xmlns:r="http://schemas.openxmlformats.org/officeDocument/2006/relationships" xmlns:p="http://schemas.openxmlformats.org/presentationml/2006/main">
   <p:cSld>
     <p:spTree>
@@ -31766,7 +32196,7 @@
 </p:sld>
 </file>
 
-<file path=ppt/slides/slide54.xml><?xml version="1.0" encoding="utf-8"?>
+<file path=ppt/slides/slide55.xml><?xml version="1.0" encoding="utf-8"?>
 <p:sld xmlns:a="http://schemas.openxmlformats.org/drawingml/2006/main" xmlns:r="http://schemas.openxmlformats.org/officeDocument/2006/relationships" xmlns:p="http://schemas.openxmlformats.org/presentationml/2006/main">
   <p:cSld>
     <p:spTree>
@@ -32114,7 +32544,7 @@
 </p:sld>
 </file>
 
-<file path=ppt/slides/slide55.xml><?xml version="1.0" encoding="utf-8"?>
+<file path=ppt/slides/slide56.xml><?xml version="1.0" encoding="utf-8"?>
 <p:sld xmlns:a="http://schemas.openxmlformats.org/drawingml/2006/main" xmlns:r="http://schemas.openxmlformats.org/officeDocument/2006/relationships" xmlns:p="http://schemas.openxmlformats.org/presentationml/2006/main">
   <p:cSld>
     <p:spTree>
@@ -34287,7 +34717,7 @@
 </p:sld>
 </file>
 
-<file path=ppt/slides/slide56.xml><?xml version="1.0" encoding="utf-8"?>
+<file path=ppt/slides/slide57.xml><?xml version="1.0" encoding="utf-8"?>
 <p:sld xmlns:a="http://schemas.openxmlformats.org/drawingml/2006/main" xmlns:r="http://schemas.openxmlformats.org/officeDocument/2006/relationships" xmlns:p="http://schemas.openxmlformats.org/presentationml/2006/main">
   <p:cSld>
     <p:spTree>
@@ -34551,11 +34981,7 @@
           <a:p>
             <a:r>
               <a:rPr lang="en-US" dirty="0" smtClean="0"/>
-              <a:t>A </a:t>
-            </a:r>
-            <a:r>
-              <a:rPr lang="en-US" dirty="0" smtClean="0"/>
-              <a:t>sample prototype for a UA-Game exploring the described approach is bundled with </a:t>
+              <a:t>A sample prototype for a UA-Game exploring the described approach is bundled with </a:t>
             </a:r>
             <a:r>
               <a:rPr lang="en-US" dirty="0" err="1" smtClean="0"/>
@@ -34603,7 +35029,6 @@
               <a:rPr lang="en-US" dirty="0" smtClean="0"/>
               <a:t> run-time tailoring potential.</a:t>
             </a:r>
-            <a:endParaRPr lang="en-US" dirty="0" smtClean="0"/>
           </a:p>
           <a:p>
             <a:r>
@@ -35129,15 +35554,7 @@
                   <a:schemeClr val="tx1"/>
                 </a:solidFill>
               </a:rPr>
-              <a:t>The human who plays the </a:t>
-            </a:r>
-            <a:r>
-              <a:rPr lang="en-US" sz="2000" dirty="0" smtClean="0">
-                <a:solidFill>
-                  <a:schemeClr val="tx1"/>
-                </a:solidFill>
-              </a:rPr>
-              <a:t>game</a:t>
+              <a:t>The human who plays the game</a:t>
             </a:r>
             <a:endParaRPr lang="en-US" sz="2000" dirty="0">
               <a:solidFill>
@@ -35232,15 +35649,7 @@
                   <a:schemeClr val="tx1"/>
                 </a:solidFill>
               </a:rPr>
-              <a:t>Game </a:t>
-            </a:r>
-            <a:r>
-              <a:rPr lang="en-US" sz="2400" b="1" dirty="0" smtClean="0">
-                <a:solidFill>
-                  <a:schemeClr val="tx1"/>
-                </a:solidFill>
-              </a:rPr>
-              <a:t>Logic</a:t>
+              <a:t>Game Logic</a:t>
             </a:r>
             <a:br>
               <a:rPr lang="en-US" sz="2400" b="1" dirty="0" smtClean="0">
@@ -35358,15 +35767,7 @@
                   <a:schemeClr val="tx1"/>
                 </a:solidFill>
               </a:rPr>
-              <a:t>Game </a:t>
-            </a:r>
-            <a:r>
-              <a:rPr lang="en-US" sz="2400" b="1" dirty="0" smtClean="0">
-                <a:solidFill>
-                  <a:schemeClr val="tx1"/>
-                </a:solidFill>
-              </a:rPr>
-              <a:t>View</a:t>
+              <a:t>Game View</a:t>
             </a:r>
             <a:br>
               <a:rPr lang="en-US" sz="2400" b="1" dirty="0" smtClean="0">

</xml_diff>